<commit_message>
annotations done; do presentation
</commit_message>
<xml_diff>
--- a/ppt/Presentation.pptx
+++ b/ppt/Presentation.pptx
@@ -5,23 +5,26 @@
     <p:sldMasterId id="2147483660" r:id="rId1"/>
   </p:sldMasterIdLst>
   <p:notesMasterIdLst>
-    <p:notesMasterId r:id="rId16"/>
+    <p:notesMasterId r:id="rId19"/>
   </p:notesMasterIdLst>
   <p:sldIdLst>
     <p:sldId id="256" r:id="rId2"/>
-    <p:sldId id="262" r:id="rId3"/>
-    <p:sldId id="263" r:id="rId4"/>
-    <p:sldId id="264" r:id="rId5"/>
-    <p:sldId id="265" r:id="rId6"/>
-    <p:sldId id="266" r:id="rId7"/>
-    <p:sldId id="267" r:id="rId8"/>
-    <p:sldId id="268" r:id="rId9"/>
-    <p:sldId id="269" r:id="rId10"/>
-    <p:sldId id="270" r:id="rId11"/>
-    <p:sldId id="257" r:id="rId12"/>
-    <p:sldId id="271" r:id="rId13"/>
-    <p:sldId id="272" r:id="rId14"/>
-    <p:sldId id="261" r:id="rId15"/>
+    <p:sldId id="274" r:id="rId3"/>
+    <p:sldId id="262" r:id="rId4"/>
+    <p:sldId id="263" r:id="rId5"/>
+    <p:sldId id="264" r:id="rId6"/>
+    <p:sldId id="265" r:id="rId7"/>
+    <p:sldId id="266" r:id="rId8"/>
+    <p:sldId id="267" r:id="rId9"/>
+    <p:sldId id="268" r:id="rId10"/>
+    <p:sldId id="269" r:id="rId11"/>
+    <p:sldId id="270" r:id="rId12"/>
+    <p:sldId id="275" r:id="rId13"/>
+    <p:sldId id="257" r:id="rId14"/>
+    <p:sldId id="271" r:id="rId15"/>
+    <p:sldId id="273" r:id="rId16"/>
+    <p:sldId id="272" r:id="rId17"/>
+    <p:sldId id="261" r:id="rId18"/>
   </p:sldIdLst>
   <p:sldSz cx="9906000" cy="6858000" type="A4"/>
   <p:notesSz cx="6858000" cy="9144000"/>
@@ -3625,7 +3628,7 @@
           <a:p>
             <a:fld id="{4FDE70D7-0AB7-4E11-8116-CCC73F5E7693}" type="datetimeFigureOut">
               <a:rPr lang="en-US" smtClean="0"/>
-              <a:t>11/17/2017</a:t>
+              <a:t>11/27/2017</a:t>
             </a:fld>
             <a:endParaRPr lang="en-US"/>
           </a:p>
@@ -3892,6 +3895,97 @@
 </p:notesMaster>
 </file>
 
+<file path=ppt/notesSlides/notesSlide1.xml><?xml version="1.0" encoding="utf-8"?>
+<p:notes xmlns:a="http://schemas.openxmlformats.org/drawingml/2006/main" xmlns:r="http://schemas.openxmlformats.org/officeDocument/2006/relationships" xmlns:p="http://schemas.openxmlformats.org/presentationml/2006/main">
+  <p:cSld>
+    <p:spTree>
+      <p:nvGrpSpPr>
+        <p:cNvPr id="1" name=""/>
+        <p:cNvGrpSpPr/>
+        <p:nvPr/>
+      </p:nvGrpSpPr>
+      <p:grpSpPr>
+        <a:xfrm>
+          <a:off x="0" y="0"/>
+          <a:ext cx="0" cy="0"/>
+          <a:chOff x="0" y="0"/>
+          <a:chExt cx="0" cy="0"/>
+        </a:xfrm>
+      </p:grpSpPr>
+      <p:sp>
+        <p:nvSpPr>
+          <p:cNvPr id="2" name="Slide Image Placeholder 1"/>
+          <p:cNvSpPr>
+            <a:spLocks noGrp="1" noRot="1" noChangeAspect="1"/>
+          </p:cNvSpPr>
+          <p:nvPr>
+            <p:ph type="sldImg"/>
+          </p:nvPr>
+        </p:nvSpPr>
+        <p:spPr/>
+      </p:sp>
+      <p:sp>
+        <p:nvSpPr>
+          <p:cNvPr id="3" name="Notes Placeholder 2"/>
+          <p:cNvSpPr>
+            <a:spLocks noGrp="1"/>
+          </p:cNvSpPr>
+          <p:nvPr>
+            <p:ph type="body" idx="1"/>
+          </p:nvPr>
+        </p:nvSpPr>
+        <p:spPr/>
+        <p:txBody>
+          <a:bodyPr/>
+          <a:lstStyle/>
+          <a:p>
+            <a:r>
+              <a:rPr lang="en-US" dirty="0"/>
+              <a:t>Take this result with a grain of salt; a lot of filtering had to be performed. Also, iteration count had to be cut; other analyses using NACEP ran with </a:t>
+            </a:r>
+            <a:r>
+              <a:rPr lang="en-US"/>
+              <a:t>10000 iterations.</a:t>
+            </a:r>
+          </a:p>
+        </p:txBody>
+      </p:sp>
+      <p:sp>
+        <p:nvSpPr>
+          <p:cNvPr id="4" name="Slide Number Placeholder 3"/>
+          <p:cNvSpPr>
+            <a:spLocks noGrp="1"/>
+          </p:cNvSpPr>
+          <p:nvPr>
+            <p:ph type="sldNum" sz="quarter" idx="10"/>
+          </p:nvPr>
+        </p:nvSpPr>
+        <p:spPr/>
+        <p:txBody>
+          <a:bodyPr/>
+          <a:lstStyle/>
+          <a:p>
+            <a:fld id="{95CC5319-9A8A-419D-94B5-1AAB5BE9DC24}" type="slidenum">
+              <a:rPr lang="en-US" smtClean="0"/>
+              <a:t>16</a:t>
+            </a:fld>
+            <a:endParaRPr lang="en-US"/>
+          </a:p>
+        </p:txBody>
+      </p:sp>
+    </p:spTree>
+    <p:extLst>
+      <p:ext uri="{BB962C8B-B14F-4D97-AF65-F5344CB8AC3E}">
+        <p14:creationId xmlns:p14="http://schemas.microsoft.com/office/powerpoint/2010/main" val="174975808"/>
+      </p:ext>
+    </p:extLst>
+  </p:cSld>
+  <p:clrMapOvr>
+    <a:masterClrMapping/>
+  </p:clrMapOvr>
+</p:notes>
+</file>
+
 <file path=ppt/slideLayouts/slideLayout1.xml><?xml version="1.0" encoding="utf-8"?>
 <p:sldLayout xmlns:a="http://schemas.openxmlformats.org/drawingml/2006/main" xmlns:r="http://schemas.openxmlformats.org/officeDocument/2006/relationships" xmlns:p="http://schemas.openxmlformats.org/presentationml/2006/main" type="title" preserve="1">
   <p:cSld name="Title Slide">
@@ -4023,7 +4117,7 @@
           <a:p>
             <a:fld id="{5070667B-8CBE-4DAB-9654-3E33F49025B8}" type="datetimeFigureOut">
               <a:rPr lang="en-US" smtClean="0"/>
-              <a:t>11/17/2017</a:t>
+              <a:t>11/27/2017</a:t>
             </a:fld>
             <a:endParaRPr lang="en-US"/>
           </a:p>
@@ -4193,7 +4287,7 @@
           <a:p>
             <a:fld id="{5070667B-8CBE-4DAB-9654-3E33F49025B8}" type="datetimeFigureOut">
               <a:rPr lang="en-US" smtClean="0"/>
-              <a:t>11/17/2017</a:t>
+              <a:t>11/27/2017</a:t>
             </a:fld>
             <a:endParaRPr lang="en-US"/>
           </a:p>
@@ -4373,7 +4467,7 @@
           <a:p>
             <a:fld id="{5070667B-8CBE-4DAB-9654-3E33F49025B8}" type="datetimeFigureOut">
               <a:rPr lang="en-US" smtClean="0"/>
-              <a:t>11/17/2017</a:t>
+              <a:t>11/27/2017</a:t>
             </a:fld>
             <a:endParaRPr lang="en-US"/>
           </a:p>
@@ -4543,7 +4637,7 @@
           <a:p>
             <a:fld id="{5070667B-8CBE-4DAB-9654-3E33F49025B8}" type="datetimeFigureOut">
               <a:rPr lang="en-US" smtClean="0"/>
-              <a:t>11/17/2017</a:t>
+              <a:t>11/27/2017</a:t>
             </a:fld>
             <a:endParaRPr lang="en-US"/>
           </a:p>
@@ -4787,7 +4881,7 @@
           <a:p>
             <a:fld id="{5070667B-8CBE-4DAB-9654-3E33F49025B8}" type="datetimeFigureOut">
               <a:rPr lang="en-US" smtClean="0"/>
-              <a:t>11/17/2017</a:t>
+              <a:t>11/27/2017</a:t>
             </a:fld>
             <a:endParaRPr lang="en-US"/>
           </a:p>
@@ -5019,7 +5113,7 @@
           <a:p>
             <a:fld id="{5070667B-8CBE-4DAB-9654-3E33F49025B8}" type="datetimeFigureOut">
               <a:rPr lang="en-US" smtClean="0"/>
-              <a:t>11/17/2017</a:t>
+              <a:t>11/27/2017</a:t>
             </a:fld>
             <a:endParaRPr lang="en-US"/>
           </a:p>
@@ -5386,7 +5480,7 @@
           <a:p>
             <a:fld id="{5070667B-8CBE-4DAB-9654-3E33F49025B8}" type="datetimeFigureOut">
               <a:rPr lang="en-US" smtClean="0"/>
-              <a:t>11/17/2017</a:t>
+              <a:t>11/27/2017</a:t>
             </a:fld>
             <a:endParaRPr lang="en-US"/>
           </a:p>
@@ -5504,7 +5598,7 @@
           <a:p>
             <a:fld id="{5070667B-8CBE-4DAB-9654-3E33F49025B8}" type="datetimeFigureOut">
               <a:rPr lang="en-US" smtClean="0"/>
-              <a:t>11/17/2017</a:t>
+              <a:t>11/27/2017</a:t>
             </a:fld>
             <a:endParaRPr lang="en-US"/>
           </a:p>
@@ -5599,7 +5693,7 @@
           <a:p>
             <a:fld id="{5070667B-8CBE-4DAB-9654-3E33F49025B8}" type="datetimeFigureOut">
               <a:rPr lang="en-US" smtClean="0"/>
-              <a:t>11/17/2017</a:t>
+              <a:t>11/27/2017</a:t>
             </a:fld>
             <a:endParaRPr lang="en-US"/>
           </a:p>
@@ -5876,7 +5970,7 @@
           <a:p>
             <a:fld id="{5070667B-8CBE-4DAB-9654-3E33F49025B8}" type="datetimeFigureOut">
               <a:rPr lang="en-US" smtClean="0"/>
-              <a:t>11/17/2017</a:t>
+              <a:t>11/27/2017</a:t>
             </a:fld>
             <a:endParaRPr lang="en-US"/>
           </a:p>
@@ -6133,7 +6227,7 @@
           <a:p>
             <a:fld id="{5070667B-8CBE-4DAB-9654-3E33F49025B8}" type="datetimeFigureOut">
               <a:rPr lang="en-US" smtClean="0"/>
-              <a:t>11/17/2017</a:t>
+              <a:t>11/27/2017</a:t>
             </a:fld>
             <a:endParaRPr lang="en-US"/>
           </a:p>
@@ -6346,7 +6440,7 @@
           <a:p>
             <a:fld id="{5070667B-8CBE-4DAB-9654-3E33F49025B8}" type="datetimeFigureOut">
               <a:rPr lang="en-US" smtClean="0"/>
-              <a:t>11/17/2017</a:t>
+              <a:t>11/27/2017</a:t>
             </a:fld>
             <a:endParaRPr lang="en-US"/>
           </a:p>
@@ -6845,6 +6939,647 @@
       </p:grpSpPr>
       <p:pic>
         <p:nvPicPr>
+          <p:cNvPr id="3" name="Picture 2">
+            <a:extLst>
+              <a:ext uri="{FF2B5EF4-FFF2-40B4-BE49-F238E27FC236}">
+                <a16:creationId xmlns:a16="http://schemas.microsoft.com/office/drawing/2014/main" id="{03FCD9DB-064E-48FD-8E83-5B344C241182}"/>
+              </a:ext>
+            </a:extLst>
+          </p:cNvPr>
+          <p:cNvPicPr>
+            <a:picLocks noChangeAspect="1"/>
+          </p:cNvPicPr>
+          <p:nvPr/>
+        </p:nvPicPr>
+        <p:blipFill rotWithShape="1">
+          <a:blip r:embed="rId2"/>
+          <a:srcRect t="35455" b="25260"/>
+          <a:stretch/>
+        </p:blipFill>
+        <p:spPr>
+          <a:xfrm>
+            <a:off x="5536180" y="131618"/>
+            <a:ext cx="4369820" cy="965638"/>
+          </a:xfrm>
+          <a:prstGeom prst="rect">
+            <a:avLst/>
+          </a:prstGeom>
+        </p:spPr>
+      </p:pic>
+      <p:graphicFrame>
+        <p:nvGraphicFramePr>
+          <p:cNvPr id="4" name="Diagram 3">
+            <a:extLst>
+              <a:ext uri="{FF2B5EF4-FFF2-40B4-BE49-F238E27FC236}">
+                <a16:creationId xmlns:a16="http://schemas.microsoft.com/office/drawing/2014/main" id="{9589D5A1-E963-4A7A-BAA6-6BAF9567C770}"/>
+              </a:ext>
+            </a:extLst>
+          </p:cNvPr>
+          <p:cNvGraphicFramePr/>
+          <p:nvPr>
+            <p:extLst>
+              <p:ext uri="{D42A27DB-BD31-4B8C-83A1-F6EECF244321}">
+                <p14:modId xmlns:p14="http://schemas.microsoft.com/office/powerpoint/2010/main" val="159866474"/>
+              </p:ext>
+            </p:extLst>
+          </p:nvPr>
+        </p:nvGraphicFramePr>
+        <p:xfrm>
+          <a:off x="0" y="131618"/>
+          <a:ext cx="3388833" cy="6594764"/>
+        </p:xfrm>
+        <a:graphic>
+          <a:graphicData uri="http://schemas.openxmlformats.org/drawingml/2006/diagram">
+            <dgm:relIds xmlns:dgm="http://schemas.openxmlformats.org/drawingml/2006/diagram" xmlns:r="http://schemas.openxmlformats.org/officeDocument/2006/relationships" r:dm="rId3" r:lo="rId4" r:qs="rId5" r:cs="rId6"/>
+          </a:graphicData>
+        </a:graphic>
+      </p:graphicFrame>
+      <p:pic>
+        <p:nvPicPr>
+          <p:cNvPr id="6" name="Picture 5">
+            <a:extLst>
+              <a:ext uri="{FF2B5EF4-FFF2-40B4-BE49-F238E27FC236}">
+                <a16:creationId xmlns:a16="http://schemas.microsoft.com/office/drawing/2014/main" id="{1F4B4065-F0DE-42BB-A061-FFB96521170B}"/>
+              </a:ext>
+            </a:extLst>
+          </p:cNvPr>
+          <p:cNvPicPr>
+            <a:picLocks noChangeAspect="1"/>
+          </p:cNvPicPr>
+          <p:nvPr/>
+        </p:nvPicPr>
+        <p:blipFill>
+          <a:blip r:embed="rId8">
+            <a:extLst>
+              <a:ext uri="{28A0092B-C50C-407E-A947-70E740481C1C}">
+                <a14:useLocalDpi xmlns:a14="http://schemas.microsoft.com/office/drawing/2010/main" val="0"/>
+              </a:ext>
+            </a:extLst>
+          </a:blip>
+          <a:stretch>
+            <a:fillRect/>
+          </a:stretch>
+        </p:blipFill>
+        <p:spPr>
+          <a:xfrm>
+            <a:off x="3767181" y="295349"/>
+            <a:ext cx="1390650" cy="638175"/>
+          </a:xfrm>
+          <a:prstGeom prst="rect">
+            <a:avLst/>
+          </a:prstGeom>
+        </p:spPr>
+      </p:pic>
+      <p:cxnSp>
+        <p:nvCxnSpPr>
+          <p:cNvPr id="8" name="Straight Arrow Connector 7">
+            <a:extLst>
+              <a:ext uri="{FF2B5EF4-FFF2-40B4-BE49-F238E27FC236}">
+                <a16:creationId xmlns:a16="http://schemas.microsoft.com/office/drawing/2014/main" id="{8861BEDA-E57D-4DF3-A960-C77FD158418B}"/>
+              </a:ext>
+            </a:extLst>
+          </p:cNvPr>
+          <p:cNvCxnSpPr>
+            <a:cxnSpLocks/>
+            <a:endCxn id="6" idx="1"/>
+          </p:cNvCxnSpPr>
+          <p:nvPr/>
+        </p:nvCxnSpPr>
+        <p:spPr>
+          <a:xfrm>
+            <a:off x="2708564" y="614437"/>
+            <a:ext cx="1058617" cy="0"/>
+          </a:xfrm>
+          <a:prstGeom prst="straightConnector1">
+            <a:avLst/>
+          </a:prstGeom>
+          <a:ln w="38100">
+            <a:solidFill>
+              <a:srgbClr val="E96F1B"/>
+            </a:solidFill>
+            <a:tailEnd type="triangle"/>
+          </a:ln>
+          <a:effectLst>
+            <a:outerShdw blurRad="50800" dist="38100" dir="2700000" algn="tl" rotWithShape="0">
+              <a:prstClr val="black">
+                <a:alpha val="40000"/>
+              </a:prstClr>
+            </a:outerShdw>
+          </a:effectLst>
+        </p:spPr>
+        <p:style>
+          <a:lnRef idx="1">
+            <a:schemeClr val="accent1"/>
+          </a:lnRef>
+          <a:fillRef idx="0">
+            <a:schemeClr val="accent1"/>
+          </a:fillRef>
+          <a:effectRef idx="0">
+            <a:schemeClr val="accent1"/>
+          </a:effectRef>
+          <a:fontRef idx="minor">
+            <a:schemeClr val="tx1"/>
+          </a:fontRef>
+        </p:style>
+      </p:cxnSp>
+      <p:cxnSp>
+        <p:nvCxnSpPr>
+          <p:cNvPr id="10" name="Straight Arrow Connector 9">
+            <a:extLst>
+              <a:ext uri="{FF2B5EF4-FFF2-40B4-BE49-F238E27FC236}">
+                <a16:creationId xmlns:a16="http://schemas.microsoft.com/office/drawing/2014/main" id="{3D1EB926-FE09-4BE3-8C81-FA16BC0C15BE}"/>
+              </a:ext>
+            </a:extLst>
+          </p:cNvPr>
+          <p:cNvCxnSpPr>
+            <a:cxnSpLocks/>
+            <a:stCxn id="6" idx="3"/>
+          </p:cNvCxnSpPr>
+          <p:nvPr/>
+        </p:nvCxnSpPr>
+        <p:spPr>
+          <a:xfrm flipV="1">
+            <a:off x="5157831" y="614436"/>
+            <a:ext cx="834260" cy="1"/>
+          </a:xfrm>
+          <a:prstGeom prst="straightConnector1">
+            <a:avLst/>
+          </a:prstGeom>
+          <a:ln w="38100">
+            <a:solidFill>
+              <a:srgbClr val="E96F1B"/>
+            </a:solidFill>
+            <a:tailEnd type="triangle"/>
+          </a:ln>
+          <a:effectLst>
+            <a:outerShdw blurRad="50800" dist="38100" dir="2700000" algn="tl" rotWithShape="0">
+              <a:prstClr val="black">
+                <a:alpha val="40000"/>
+              </a:prstClr>
+            </a:outerShdw>
+          </a:effectLst>
+        </p:spPr>
+        <p:style>
+          <a:lnRef idx="1">
+            <a:schemeClr val="accent1"/>
+          </a:lnRef>
+          <a:fillRef idx="0">
+            <a:schemeClr val="accent1"/>
+          </a:fillRef>
+          <a:effectRef idx="0">
+            <a:schemeClr val="accent1"/>
+          </a:effectRef>
+          <a:fontRef idx="minor">
+            <a:schemeClr val="tx1"/>
+          </a:fontRef>
+        </p:style>
+      </p:cxnSp>
+      <p:sp>
+        <p:nvSpPr>
+          <p:cNvPr id="14" name="TextBox 13">
+            <a:extLst>
+              <a:ext uri="{FF2B5EF4-FFF2-40B4-BE49-F238E27FC236}">
+                <a16:creationId xmlns:a16="http://schemas.microsoft.com/office/drawing/2014/main" id="{6316DA6A-0375-48D1-BD44-7B1039DC48CD}"/>
+              </a:ext>
+            </a:extLst>
+          </p:cNvPr>
+          <p:cNvSpPr txBox="1"/>
+          <p:nvPr/>
+        </p:nvSpPr>
+        <p:spPr>
+          <a:xfrm>
+            <a:off x="4237916" y="1640613"/>
+            <a:ext cx="4558506" cy="400110"/>
+          </a:xfrm>
+          <a:prstGeom prst="rect">
+            <a:avLst/>
+          </a:prstGeom>
+        </p:spPr>
+        <p:style>
+          <a:lnRef idx="0">
+            <a:schemeClr val="accent3"/>
+          </a:lnRef>
+          <a:fillRef idx="3">
+            <a:schemeClr val="accent3"/>
+          </a:fillRef>
+          <a:effectRef idx="3">
+            <a:schemeClr val="accent3"/>
+          </a:effectRef>
+          <a:fontRef idx="minor">
+            <a:schemeClr val="lt1"/>
+          </a:fontRef>
+        </p:style>
+        <p:txBody>
+          <a:bodyPr wrap="square" rtlCol="0">
+            <a:spAutoFit/>
+          </a:bodyPr>
+          <a:lstStyle/>
+          <a:p>
+            <a:pPr algn="ctr"/>
+            <a:r>
+              <a:rPr lang="en-US" sz="2000" dirty="0">
+                <a:latin typeface="Arial" panose="020B0604020202020204" pitchFamily="34" charset="0"/>
+                <a:cs typeface="Arial" panose="020B0604020202020204" pitchFamily="34" charset="0"/>
+              </a:rPr>
+              <a:t>Principal Components Analysis</a:t>
+            </a:r>
+          </a:p>
+        </p:txBody>
+      </p:sp>
+      <p:sp>
+        <p:nvSpPr>
+          <p:cNvPr id="16" name="TextBox 15">
+            <a:extLst>
+              <a:ext uri="{FF2B5EF4-FFF2-40B4-BE49-F238E27FC236}">
+                <a16:creationId xmlns:a16="http://schemas.microsoft.com/office/drawing/2014/main" id="{851706C7-36AA-4279-976B-86FAD8B3401D}"/>
+              </a:ext>
+            </a:extLst>
+          </p:cNvPr>
+          <p:cNvSpPr txBox="1"/>
+          <p:nvPr/>
+        </p:nvSpPr>
+        <p:spPr>
+          <a:xfrm>
+            <a:off x="4237916" y="3228945"/>
+            <a:ext cx="4558506" cy="400110"/>
+          </a:xfrm>
+          <a:prstGeom prst="rect">
+            <a:avLst/>
+          </a:prstGeom>
+        </p:spPr>
+        <p:style>
+          <a:lnRef idx="0">
+            <a:schemeClr val="accent4"/>
+          </a:lnRef>
+          <a:fillRef idx="3">
+            <a:schemeClr val="accent4"/>
+          </a:fillRef>
+          <a:effectRef idx="3">
+            <a:schemeClr val="accent4"/>
+          </a:effectRef>
+          <a:fontRef idx="minor">
+            <a:schemeClr val="lt1"/>
+          </a:fontRef>
+        </p:style>
+        <p:txBody>
+          <a:bodyPr wrap="square" rtlCol="0">
+            <a:spAutoFit/>
+          </a:bodyPr>
+          <a:lstStyle/>
+          <a:p>
+            <a:pPr algn="ctr"/>
+            <a:r>
+              <a:rPr lang="en-US" sz="2000" dirty="0">
+                <a:latin typeface="Arial" panose="020B0604020202020204" pitchFamily="34" charset="0"/>
+                <a:cs typeface="Arial" panose="020B0604020202020204" pitchFamily="34" charset="0"/>
+              </a:rPr>
+              <a:t>Filter data by expression and variance</a:t>
+            </a:r>
+          </a:p>
+        </p:txBody>
+      </p:sp>
+      <p:sp>
+        <p:nvSpPr>
+          <p:cNvPr id="17" name="TextBox 16">
+            <a:extLst>
+              <a:ext uri="{FF2B5EF4-FFF2-40B4-BE49-F238E27FC236}">
+                <a16:creationId xmlns:a16="http://schemas.microsoft.com/office/drawing/2014/main" id="{96351237-DCD5-4EDE-B060-00A8C1F74F6F}"/>
+              </a:ext>
+            </a:extLst>
+          </p:cNvPr>
+          <p:cNvSpPr txBox="1"/>
+          <p:nvPr/>
+        </p:nvSpPr>
+        <p:spPr>
+          <a:xfrm>
+            <a:off x="4237916" y="4617222"/>
+            <a:ext cx="4558506" cy="400110"/>
+          </a:xfrm>
+          <a:prstGeom prst="rect">
+            <a:avLst/>
+          </a:prstGeom>
+        </p:spPr>
+        <p:style>
+          <a:lnRef idx="0">
+            <a:schemeClr val="accent5"/>
+          </a:lnRef>
+          <a:fillRef idx="3">
+            <a:schemeClr val="accent5"/>
+          </a:fillRef>
+          <a:effectRef idx="3">
+            <a:schemeClr val="accent5"/>
+          </a:effectRef>
+          <a:fontRef idx="minor">
+            <a:schemeClr val="lt1"/>
+          </a:fontRef>
+        </p:style>
+        <p:txBody>
+          <a:bodyPr wrap="square" rtlCol="0">
+            <a:spAutoFit/>
+          </a:bodyPr>
+          <a:lstStyle/>
+          <a:p>
+            <a:pPr algn="ctr"/>
+            <a:r>
+              <a:rPr lang="en-US" sz="2000" dirty="0">
+                <a:latin typeface="Arial" panose="020B0604020202020204" pitchFamily="34" charset="0"/>
+                <a:cs typeface="Arial" panose="020B0604020202020204" pitchFamily="34" charset="0"/>
+              </a:rPr>
+              <a:t>Run NACEP on filtered dataset</a:t>
+            </a:r>
+          </a:p>
+        </p:txBody>
+      </p:sp>
+      <p:sp>
+        <p:nvSpPr>
+          <p:cNvPr id="18" name="TextBox 17">
+            <a:extLst>
+              <a:ext uri="{FF2B5EF4-FFF2-40B4-BE49-F238E27FC236}">
+                <a16:creationId xmlns:a16="http://schemas.microsoft.com/office/drawing/2014/main" id="{AD102C80-7620-43C2-9294-55EC4B338D66}"/>
+              </a:ext>
+            </a:extLst>
+          </p:cNvPr>
+          <p:cNvSpPr txBox="1"/>
+          <p:nvPr/>
+        </p:nvSpPr>
+        <p:spPr>
+          <a:xfrm>
+            <a:off x="4237916" y="6006650"/>
+            <a:ext cx="4558506" cy="400110"/>
+          </a:xfrm>
+          <a:prstGeom prst="rect">
+            <a:avLst/>
+          </a:prstGeom>
+        </p:spPr>
+        <p:style>
+          <a:lnRef idx="0">
+            <a:schemeClr val="accent6"/>
+          </a:lnRef>
+          <a:fillRef idx="3">
+            <a:schemeClr val="accent6"/>
+          </a:fillRef>
+          <a:effectRef idx="3">
+            <a:schemeClr val="accent6"/>
+          </a:effectRef>
+          <a:fontRef idx="minor">
+            <a:schemeClr val="lt1"/>
+          </a:fontRef>
+        </p:style>
+        <p:txBody>
+          <a:bodyPr wrap="square" rtlCol="0">
+            <a:spAutoFit/>
+          </a:bodyPr>
+          <a:lstStyle/>
+          <a:p>
+            <a:pPr algn="ctr"/>
+            <a:r>
+              <a:rPr lang="en-US" sz="2000" dirty="0">
+                <a:latin typeface="Arial" panose="020B0604020202020204" pitchFamily="34" charset="0"/>
+                <a:cs typeface="Arial" panose="020B0604020202020204" pitchFamily="34" charset="0"/>
+              </a:rPr>
+              <a:t>ID diff. expr. genes</a:t>
+            </a:r>
+          </a:p>
+        </p:txBody>
+      </p:sp>
+      <p:cxnSp>
+        <p:nvCxnSpPr>
+          <p:cNvPr id="19" name="Straight Arrow Connector 18">
+            <a:extLst>
+              <a:ext uri="{FF2B5EF4-FFF2-40B4-BE49-F238E27FC236}">
+                <a16:creationId xmlns:a16="http://schemas.microsoft.com/office/drawing/2014/main" id="{AE19DBF2-8BD9-4BD6-9221-8544C97C08C4}"/>
+              </a:ext>
+            </a:extLst>
+          </p:cNvPr>
+          <p:cNvCxnSpPr>
+            <a:cxnSpLocks/>
+            <a:endCxn id="14" idx="1"/>
+          </p:cNvCxnSpPr>
+          <p:nvPr/>
+        </p:nvCxnSpPr>
+        <p:spPr>
+          <a:xfrm flipV="1">
+            <a:off x="2708564" y="1840668"/>
+            <a:ext cx="1529352" cy="11764"/>
+          </a:xfrm>
+          <a:prstGeom prst="straightConnector1">
+            <a:avLst/>
+          </a:prstGeom>
+          <a:ln w="38100">
+            <a:solidFill>
+              <a:srgbClr val="AAAAAA"/>
+            </a:solidFill>
+            <a:tailEnd type="triangle"/>
+          </a:ln>
+          <a:effectLst>
+            <a:outerShdw blurRad="50800" dist="38100" dir="2700000" algn="tl" rotWithShape="0">
+              <a:prstClr val="black">
+                <a:alpha val="40000"/>
+              </a:prstClr>
+            </a:outerShdw>
+          </a:effectLst>
+        </p:spPr>
+        <p:style>
+          <a:lnRef idx="1">
+            <a:schemeClr val="accent1"/>
+          </a:lnRef>
+          <a:fillRef idx="0">
+            <a:schemeClr val="accent1"/>
+          </a:fillRef>
+          <a:effectRef idx="0">
+            <a:schemeClr val="accent1"/>
+          </a:effectRef>
+          <a:fontRef idx="minor">
+            <a:schemeClr val="tx1"/>
+          </a:fontRef>
+        </p:style>
+      </p:cxnSp>
+      <p:cxnSp>
+        <p:nvCxnSpPr>
+          <p:cNvPr id="21" name="Straight Arrow Connector 20">
+            <a:extLst>
+              <a:ext uri="{FF2B5EF4-FFF2-40B4-BE49-F238E27FC236}">
+                <a16:creationId xmlns:a16="http://schemas.microsoft.com/office/drawing/2014/main" id="{C6868F69-CF29-48EC-AF46-FFEBAB812C15}"/>
+              </a:ext>
+            </a:extLst>
+          </p:cNvPr>
+          <p:cNvCxnSpPr>
+            <a:cxnSpLocks/>
+            <a:endCxn id="16" idx="1"/>
+          </p:cNvCxnSpPr>
+          <p:nvPr/>
+        </p:nvCxnSpPr>
+        <p:spPr>
+          <a:xfrm>
+            <a:off x="2708564" y="3429000"/>
+            <a:ext cx="1529352" cy="0"/>
+          </a:xfrm>
+          <a:prstGeom prst="straightConnector1">
+            <a:avLst/>
+          </a:prstGeom>
+          <a:ln w="38100">
+            <a:solidFill>
+              <a:srgbClr val="FFC724"/>
+            </a:solidFill>
+            <a:tailEnd type="triangle"/>
+          </a:ln>
+          <a:effectLst>
+            <a:outerShdw blurRad="50800" dist="38100" dir="2700000" algn="tl" rotWithShape="0">
+              <a:prstClr val="black">
+                <a:alpha val="40000"/>
+              </a:prstClr>
+            </a:outerShdw>
+          </a:effectLst>
+        </p:spPr>
+        <p:style>
+          <a:lnRef idx="1">
+            <a:schemeClr val="accent1"/>
+          </a:lnRef>
+          <a:fillRef idx="0">
+            <a:schemeClr val="accent1"/>
+          </a:fillRef>
+          <a:effectRef idx="0">
+            <a:schemeClr val="accent1"/>
+          </a:effectRef>
+          <a:fontRef idx="minor">
+            <a:schemeClr val="tx1"/>
+          </a:fontRef>
+        </p:style>
+      </p:cxnSp>
+      <p:cxnSp>
+        <p:nvCxnSpPr>
+          <p:cNvPr id="24" name="Straight Arrow Connector 23">
+            <a:extLst>
+              <a:ext uri="{FF2B5EF4-FFF2-40B4-BE49-F238E27FC236}">
+                <a16:creationId xmlns:a16="http://schemas.microsoft.com/office/drawing/2014/main" id="{ACA85054-11B0-4553-B41A-3D8A8E6E4AF5}"/>
+              </a:ext>
+            </a:extLst>
+          </p:cNvPr>
+          <p:cNvCxnSpPr>
+            <a:cxnSpLocks/>
+          </p:cNvCxnSpPr>
+          <p:nvPr/>
+        </p:nvCxnSpPr>
+        <p:spPr>
+          <a:xfrm>
+            <a:off x="2708564" y="4817277"/>
+            <a:ext cx="1529352" cy="0"/>
+          </a:xfrm>
+          <a:prstGeom prst="straightConnector1">
+            <a:avLst/>
+          </a:prstGeom>
+          <a:ln w="38100">
+            <a:solidFill>
+              <a:srgbClr val="609FDB"/>
+            </a:solidFill>
+            <a:tailEnd type="triangle"/>
+          </a:ln>
+          <a:effectLst>
+            <a:outerShdw blurRad="50800" dist="38100" dir="2700000" algn="tl" rotWithShape="0">
+              <a:prstClr val="black">
+                <a:alpha val="40000"/>
+              </a:prstClr>
+            </a:outerShdw>
+          </a:effectLst>
+        </p:spPr>
+        <p:style>
+          <a:lnRef idx="1">
+            <a:schemeClr val="accent1"/>
+          </a:lnRef>
+          <a:fillRef idx="0">
+            <a:schemeClr val="accent1"/>
+          </a:fillRef>
+          <a:effectRef idx="0">
+            <a:schemeClr val="accent1"/>
+          </a:effectRef>
+          <a:fontRef idx="minor">
+            <a:schemeClr val="tx1"/>
+          </a:fontRef>
+        </p:style>
+      </p:cxnSp>
+      <p:cxnSp>
+        <p:nvCxnSpPr>
+          <p:cNvPr id="25" name="Straight Arrow Connector 24">
+            <a:extLst>
+              <a:ext uri="{FF2B5EF4-FFF2-40B4-BE49-F238E27FC236}">
+                <a16:creationId xmlns:a16="http://schemas.microsoft.com/office/drawing/2014/main" id="{4ECFFED8-4F34-410D-8880-6F4282FC6A99}"/>
+              </a:ext>
+            </a:extLst>
+          </p:cNvPr>
+          <p:cNvCxnSpPr>
+            <a:cxnSpLocks/>
+          </p:cNvCxnSpPr>
+          <p:nvPr/>
+        </p:nvCxnSpPr>
+        <p:spPr>
+          <a:xfrm>
+            <a:off x="2708564" y="6206705"/>
+            <a:ext cx="1529352" cy="0"/>
+          </a:xfrm>
+          <a:prstGeom prst="straightConnector1">
+            <a:avLst/>
+          </a:prstGeom>
+          <a:ln w="38100">
+            <a:solidFill>
+              <a:srgbClr val="74B44A"/>
+            </a:solidFill>
+            <a:tailEnd type="triangle"/>
+          </a:ln>
+          <a:effectLst>
+            <a:outerShdw blurRad="50800" dist="38100" dir="2700000" algn="tl" rotWithShape="0">
+              <a:prstClr val="black">
+                <a:alpha val="40000"/>
+              </a:prstClr>
+            </a:outerShdw>
+          </a:effectLst>
+        </p:spPr>
+        <p:style>
+          <a:lnRef idx="1">
+            <a:schemeClr val="accent1"/>
+          </a:lnRef>
+          <a:fillRef idx="0">
+            <a:schemeClr val="accent1"/>
+          </a:fillRef>
+          <a:effectRef idx="0">
+            <a:schemeClr val="accent1"/>
+          </a:effectRef>
+          <a:fontRef idx="minor">
+            <a:schemeClr val="tx1"/>
+          </a:fontRef>
+        </p:style>
+      </p:cxnSp>
+    </p:spTree>
+    <p:extLst>
+      <p:ext uri="{BB962C8B-B14F-4D97-AF65-F5344CB8AC3E}">
+        <p14:creationId xmlns:p14="http://schemas.microsoft.com/office/powerpoint/2010/main" val="1348944768"/>
+      </p:ext>
+    </p:extLst>
+  </p:cSld>
+  <p:clrMapOvr>
+    <a:masterClrMapping/>
+  </p:clrMapOvr>
+</p:sld>
+</file>
+
+<file path=ppt/slides/slide11.xml><?xml version="1.0" encoding="utf-8"?>
+<p:sld xmlns:a="http://schemas.openxmlformats.org/drawingml/2006/main" xmlns:r="http://schemas.openxmlformats.org/officeDocument/2006/relationships" xmlns:p="http://schemas.openxmlformats.org/presentationml/2006/main">
+  <p:cSld>
+    <p:spTree>
+      <p:nvGrpSpPr>
+        <p:cNvPr id="1" name=""/>
+        <p:cNvGrpSpPr/>
+        <p:nvPr/>
+      </p:nvGrpSpPr>
+      <p:grpSpPr>
+        <a:xfrm>
+          <a:off x="0" y="0"/>
+          <a:ext cx="0" cy="0"/>
+          <a:chOff x="0" y="0"/>
+          <a:chExt cx="0" cy="0"/>
+        </a:xfrm>
+      </p:grpSpPr>
+      <p:pic>
+        <p:nvPicPr>
           <p:cNvPr id="2" name="Picture 1">
             <a:extLst>
               <a:ext uri="{FF2B5EF4-FFF2-40B4-BE49-F238E27FC236}">
@@ -7071,7 +7806,212 @@
 </p:sld>
 </file>
 
-<file path=ppt/slides/slide11.xml><?xml version="1.0" encoding="utf-8"?>
+<file path=ppt/slides/slide12.xml><?xml version="1.0" encoding="utf-8"?>
+<p:sld xmlns:a="http://schemas.openxmlformats.org/drawingml/2006/main" xmlns:r="http://schemas.openxmlformats.org/officeDocument/2006/relationships" xmlns:p="http://schemas.openxmlformats.org/presentationml/2006/main">
+  <p:cSld>
+    <p:spTree>
+      <p:nvGrpSpPr>
+        <p:cNvPr id="1" name=""/>
+        <p:cNvGrpSpPr/>
+        <p:nvPr/>
+      </p:nvGrpSpPr>
+      <p:grpSpPr>
+        <a:xfrm>
+          <a:off x="0" y="0"/>
+          <a:ext cx="0" cy="0"/>
+          <a:chOff x="0" y="0"/>
+          <a:chExt cx="0" cy="0"/>
+        </a:xfrm>
+      </p:grpSpPr>
+      <p:sp>
+        <p:nvSpPr>
+          <p:cNvPr id="2" name="Title 1">
+            <a:extLst>
+              <a:ext uri="{FF2B5EF4-FFF2-40B4-BE49-F238E27FC236}">
+                <a16:creationId xmlns:a16="http://schemas.microsoft.com/office/drawing/2014/main" id="{39BF8182-CC74-4559-B1C0-2422CBD07139}"/>
+              </a:ext>
+            </a:extLst>
+          </p:cNvPr>
+          <p:cNvSpPr>
+            <a:spLocks noGrp="1"/>
+          </p:cNvSpPr>
+          <p:nvPr>
+            <p:ph type="title"/>
+          </p:nvPr>
+        </p:nvSpPr>
+        <p:spPr>
+          <a:xfrm>
+            <a:off x="642632" y="585457"/>
+            <a:ext cx="8543925" cy="1325563"/>
+          </a:xfrm>
+        </p:spPr>
+        <p:txBody>
+          <a:bodyPr>
+            <a:normAutofit/>
+          </a:bodyPr>
+          <a:lstStyle/>
+          <a:p>
+            <a:r>
+              <a:rPr lang="en-US" sz="3600" dirty="0">
+                <a:latin typeface="Arial" panose="020B0604020202020204" pitchFamily="34" charset="0"/>
+                <a:cs typeface="Arial" panose="020B0604020202020204" pitchFamily="34" charset="0"/>
+              </a:rPr>
+              <a:t>Sample Principal Components Analysis</a:t>
+            </a:r>
+          </a:p>
+        </p:txBody>
+      </p:sp>
+      <p:sp>
+        <p:nvSpPr>
+          <p:cNvPr id="17" name="TextBox 16">
+            <a:extLst>
+              <a:ext uri="{FF2B5EF4-FFF2-40B4-BE49-F238E27FC236}">
+                <a16:creationId xmlns:a16="http://schemas.microsoft.com/office/drawing/2014/main" id="{86E5EDC8-691B-414A-A1A8-28D446CB1D7B}"/>
+              </a:ext>
+            </a:extLst>
+          </p:cNvPr>
+          <p:cNvSpPr txBox="1"/>
+          <p:nvPr/>
+        </p:nvSpPr>
+        <p:spPr>
+          <a:xfrm>
+            <a:off x="642632" y="2486891"/>
+            <a:ext cx="8620733" cy="3785652"/>
+          </a:xfrm>
+          <a:prstGeom prst="rect">
+            <a:avLst/>
+          </a:prstGeom>
+          <a:noFill/>
+        </p:spPr>
+        <p:txBody>
+          <a:bodyPr wrap="square" rtlCol="0">
+            <a:spAutoFit/>
+          </a:bodyPr>
+          <a:lstStyle/>
+          <a:p>
+            <a:pPr marL="285750" indent="-285750">
+              <a:buFont typeface="Arial" panose="020B0604020202020204" pitchFamily="34" charset="0"/>
+              <a:buChar char="•"/>
+            </a:pPr>
+            <a:r>
+              <a:rPr lang="en-US" sz="2400" dirty="0">
+                <a:latin typeface="Arial" panose="020B0604020202020204" pitchFamily="34" charset="0"/>
+                <a:cs typeface="Arial" panose="020B0604020202020204" pitchFamily="34" charset="0"/>
+              </a:rPr>
+              <a:t>Convert possibly correlated values into linearly uncorrelated </a:t>
+            </a:r>
+            <a:r>
+              <a:rPr lang="en-US" sz="2400" b="1" dirty="0">
+                <a:latin typeface="Arial" panose="020B0604020202020204" pitchFamily="34" charset="0"/>
+                <a:cs typeface="Arial" panose="020B0604020202020204" pitchFamily="34" charset="0"/>
+              </a:rPr>
+              <a:t>principal components</a:t>
+            </a:r>
+          </a:p>
+          <a:p>
+            <a:pPr marL="742950" lvl="1" indent="-285750">
+              <a:buFont typeface="Arial" panose="020B0604020202020204" pitchFamily="34" charset="0"/>
+              <a:buChar char="•"/>
+            </a:pPr>
+            <a:r>
+              <a:rPr lang="en-US" sz="2400" dirty="0">
+                <a:latin typeface="Arial" panose="020B0604020202020204" pitchFamily="34" charset="0"/>
+                <a:cs typeface="Arial" panose="020B0604020202020204" pitchFamily="34" charset="0"/>
+              </a:rPr>
+              <a:t>Resulting vectors are mutually orthogonal</a:t>
+            </a:r>
+          </a:p>
+          <a:p>
+            <a:pPr marL="285750" indent="-285750">
+              <a:buFont typeface="Arial" panose="020B0604020202020204" pitchFamily="34" charset="0"/>
+              <a:buChar char="•"/>
+            </a:pPr>
+            <a:r>
+              <a:rPr lang="en-US" sz="2400" dirty="0">
+                <a:latin typeface="Arial" panose="020B0604020202020204" pitchFamily="34" charset="0"/>
+                <a:cs typeface="Arial" panose="020B0604020202020204" pitchFamily="34" charset="0"/>
+              </a:rPr>
+              <a:t>Summarizes data points by data variance</a:t>
+            </a:r>
+          </a:p>
+          <a:p>
+            <a:pPr marL="285750" indent="-285750">
+              <a:buFont typeface="Arial" panose="020B0604020202020204" pitchFamily="34" charset="0"/>
+              <a:buChar char="•"/>
+            </a:pPr>
+            <a:r>
+              <a:rPr lang="en-US" sz="2400" dirty="0">
+                <a:latin typeface="Arial" panose="020B0604020202020204" pitchFamily="34" charset="0"/>
+                <a:cs typeface="Arial" panose="020B0604020202020204" pitchFamily="34" charset="0"/>
+              </a:rPr>
+              <a:t>Procedure:</a:t>
+            </a:r>
+          </a:p>
+          <a:p>
+            <a:pPr marL="742950" lvl="1" indent="-285750">
+              <a:buFont typeface="Arial" panose="020B0604020202020204" pitchFamily="34" charset="0"/>
+              <a:buChar char="•"/>
+            </a:pPr>
+            <a:r>
+              <a:rPr lang="en-US" sz="2400" dirty="0">
+                <a:latin typeface="Arial" panose="020B0604020202020204" pitchFamily="34" charset="0"/>
+                <a:cs typeface="Arial" panose="020B0604020202020204" pitchFamily="34" charset="0"/>
+              </a:rPr>
+              <a:t>Perform variance stabilizing transformation on counts matrix</a:t>
+            </a:r>
+          </a:p>
+          <a:p>
+            <a:pPr marL="742950" lvl="1" indent="-285750">
+              <a:buFont typeface="Arial" panose="020B0604020202020204" pitchFamily="34" charset="0"/>
+              <a:buChar char="•"/>
+            </a:pPr>
+            <a:r>
+              <a:rPr lang="en-US" sz="2400" dirty="0">
+                <a:latin typeface="Arial" panose="020B0604020202020204" pitchFamily="34" charset="0"/>
+                <a:cs typeface="Arial" panose="020B0604020202020204" pitchFamily="34" charset="0"/>
+              </a:rPr>
+              <a:t>Calculate scaled and centered principal components</a:t>
+            </a:r>
+          </a:p>
+          <a:p>
+            <a:pPr marL="742950" lvl="1" indent="-285750">
+              <a:buFont typeface="Arial" panose="020B0604020202020204" pitchFamily="34" charset="0"/>
+              <a:buChar char="•"/>
+            </a:pPr>
+            <a:r>
+              <a:rPr lang="en-US" sz="2400" dirty="0">
+                <a:latin typeface="Arial" panose="020B0604020202020204" pitchFamily="34" charset="0"/>
+                <a:cs typeface="Arial" panose="020B0604020202020204" pitchFamily="34" charset="0"/>
+              </a:rPr>
+              <a:t>Rotate and plot</a:t>
+            </a:r>
+          </a:p>
+          <a:p>
+            <a:pPr marL="285750" indent="-285750">
+              <a:buFont typeface="Arial" panose="020B0604020202020204" pitchFamily="34" charset="0"/>
+              <a:buChar char="•"/>
+            </a:pPr>
+            <a:endParaRPr lang="en-US" sz="2400" dirty="0">
+              <a:latin typeface="Arial" panose="020B0604020202020204" pitchFamily="34" charset="0"/>
+              <a:cs typeface="Arial" panose="020B0604020202020204" pitchFamily="34" charset="0"/>
+            </a:endParaRPr>
+          </a:p>
+        </p:txBody>
+      </p:sp>
+    </p:spTree>
+    <p:extLst>
+      <p:ext uri="{BB962C8B-B14F-4D97-AF65-F5344CB8AC3E}">
+        <p14:creationId xmlns:p14="http://schemas.microsoft.com/office/powerpoint/2010/main" val="2400602074"/>
+      </p:ext>
+    </p:extLst>
+  </p:cSld>
+  <p:clrMapOvr>
+    <a:masterClrMapping/>
+  </p:clrMapOvr>
+</p:sld>
+</file>
+
+<file path=ppt/slides/slide13.xml><?xml version="1.0" encoding="utf-8"?>
 <p:sld xmlns:a="http://schemas.openxmlformats.org/drawingml/2006/main" xmlns:r="http://schemas.openxmlformats.org/officeDocument/2006/relationships" xmlns:p="http://schemas.openxmlformats.org/presentationml/2006/main">
   <p:cSld>
     <p:spTree>
@@ -8829,7 +9769,7 @@
 </p:sld>
 </file>
 
-<file path=ppt/slides/slide12.xml><?xml version="1.0" encoding="utf-8"?>
+<file path=ppt/slides/slide14.xml><?xml version="1.0" encoding="utf-8"?>
 <p:sld xmlns:a="http://schemas.openxmlformats.org/drawingml/2006/main" xmlns:r="http://schemas.openxmlformats.org/officeDocument/2006/relationships" xmlns:p="http://schemas.openxmlformats.org/presentationml/2006/main">
   <p:cSld>
     <p:spTree>
@@ -8963,6 +9903,16 @@
               <a:t>(gene variance) &gt;= 2.4</a:t>
             </a:r>
           </a:p>
+          <a:p>
+            <a:pPr lvl="1"/>
+            <a:r>
+              <a:rPr lang="en-US" sz="2000" dirty="0">
+                <a:latin typeface="Arial" panose="020B0604020202020204" pitchFamily="34" charset="0"/>
+                <a:cs typeface="Arial" panose="020B0604020202020204" pitchFamily="34" charset="0"/>
+              </a:rPr>
+              <a:t>Result: 4022 genes retained out of 25702 genes</a:t>
+            </a:r>
+          </a:p>
         </p:txBody>
       </p:sp>
     </p:spTree>
@@ -8978,7 +9928,325 @@
 </p:sld>
 </file>
 
-<file path=ppt/slides/slide13.xml><?xml version="1.0" encoding="utf-8"?>
+<file path=ppt/slides/slide15.xml><?xml version="1.0" encoding="utf-8"?>
+<p:sld xmlns:a="http://schemas.openxmlformats.org/drawingml/2006/main" xmlns:r="http://schemas.openxmlformats.org/officeDocument/2006/relationships" xmlns:p="http://schemas.openxmlformats.org/presentationml/2006/main">
+  <p:cSld>
+    <p:spTree>
+      <p:nvGrpSpPr>
+        <p:cNvPr id="1" name=""/>
+        <p:cNvGrpSpPr/>
+        <p:nvPr/>
+      </p:nvGrpSpPr>
+      <p:grpSpPr>
+        <a:xfrm>
+          <a:off x="0" y="0"/>
+          <a:ext cx="0" cy="0"/>
+          <a:chOff x="0" y="0"/>
+          <a:chExt cx="0" cy="0"/>
+        </a:xfrm>
+      </p:grpSpPr>
+      <p:sp>
+        <p:nvSpPr>
+          <p:cNvPr id="2" name="Title 1">
+            <a:extLst>
+              <a:ext uri="{FF2B5EF4-FFF2-40B4-BE49-F238E27FC236}">
+                <a16:creationId xmlns:a16="http://schemas.microsoft.com/office/drawing/2014/main" id="{0E48E1EA-AB78-46D0-8851-C042B30095C2}"/>
+              </a:ext>
+            </a:extLst>
+          </p:cNvPr>
+          <p:cNvSpPr>
+            <a:spLocks noGrp="1"/>
+          </p:cNvSpPr>
+          <p:nvPr>
+            <p:ph type="title"/>
+          </p:nvPr>
+        </p:nvSpPr>
+        <p:spPr/>
+        <p:txBody>
+          <a:bodyPr>
+            <a:normAutofit/>
+          </a:bodyPr>
+          <a:lstStyle/>
+          <a:p>
+            <a:r>
+              <a:rPr lang="en-US" sz="3600" dirty="0">
+                <a:latin typeface="Arial" panose="020B0604020202020204" pitchFamily="34" charset="0"/>
+                <a:cs typeface="Arial" panose="020B0604020202020204" pitchFamily="34" charset="0"/>
+              </a:rPr>
+              <a:t>NACEP Function Call and Parameters</a:t>
+            </a:r>
+          </a:p>
+        </p:txBody>
+      </p:sp>
+      <p:sp>
+        <p:nvSpPr>
+          <p:cNvPr id="3" name="Content Placeholder 2">
+            <a:extLst>
+              <a:ext uri="{FF2B5EF4-FFF2-40B4-BE49-F238E27FC236}">
+                <a16:creationId xmlns:a16="http://schemas.microsoft.com/office/drawing/2014/main" id="{3D392EA7-471C-4869-88C0-C8CAE862C49A}"/>
+              </a:ext>
+            </a:extLst>
+          </p:cNvPr>
+          <p:cNvSpPr>
+            <a:spLocks noGrp="1"/>
+          </p:cNvSpPr>
+          <p:nvPr>
+            <p:ph idx="1"/>
+          </p:nvPr>
+        </p:nvSpPr>
+        <p:spPr>
+          <a:xfrm>
+            <a:off x="134816" y="1825625"/>
+            <a:ext cx="9636368" cy="4351338"/>
+          </a:xfrm>
+        </p:spPr>
+        <p:txBody>
+          <a:bodyPr>
+            <a:normAutofit/>
+          </a:bodyPr>
+          <a:lstStyle/>
+          <a:p>
+            <a:pPr marL="0" indent="0">
+              <a:buNone/>
+            </a:pPr>
+            <a:r>
+              <a:rPr lang="en-US" sz="2000" dirty="0">
+                <a:latin typeface="Roboto Mono Medium for Powerlin" pitchFamily="2" charset="0"/>
+                <a:ea typeface="Roboto Mono Medium for Powerlin" pitchFamily="2" charset="0"/>
+                <a:cs typeface="Arial" panose="020B0604020202020204" pitchFamily="34" charset="0"/>
+              </a:rPr>
+              <a:t>source("</a:t>
+            </a:r>
+            <a:r>
+              <a:rPr lang="en-US" sz="2000" dirty="0" err="1">
+                <a:latin typeface="Roboto Mono Medium for Powerlin" pitchFamily="2" charset="0"/>
+                <a:ea typeface="Roboto Mono Medium for Powerlin" pitchFamily="2" charset="0"/>
+                <a:cs typeface="Arial" panose="020B0604020202020204" pitchFamily="34" charset="0"/>
+              </a:rPr>
+              <a:t>NACEP.r</a:t>
+            </a:r>
+            <a:r>
+              <a:rPr lang="en-US" sz="2000" dirty="0">
+                <a:latin typeface="Roboto Mono Medium for Powerlin" pitchFamily="2" charset="0"/>
+                <a:ea typeface="Roboto Mono Medium for Powerlin" pitchFamily="2" charset="0"/>
+                <a:cs typeface="Arial" panose="020B0604020202020204" pitchFamily="34" charset="0"/>
+              </a:rPr>
+              <a:t>");</a:t>
+            </a:r>
+          </a:p>
+          <a:p>
+            <a:pPr marL="0" indent="0">
+              <a:buNone/>
+            </a:pPr>
+            <a:r>
+              <a:rPr lang="en-US" sz="2000" dirty="0">
+                <a:latin typeface="Roboto Mono Medium for Powerlin" pitchFamily="2" charset="0"/>
+                <a:ea typeface="Roboto Mono Medium for Powerlin" pitchFamily="2" charset="0"/>
+                <a:cs typeface="Arial" panose="020B0604020202020204" pitchFamily="34" charset="0"/>
+              </a:rPr>
+              <a:t>NACEP(filename="dataFilter.txt",	# input file</a:t>
+            </a:r>
+          </a:p>
+          <a:p>
+            <a:pPr marL="0" indent="0">
+              <a:buNone/>
+            </a:pPr>
+            <a:r>
+              <a:rPr lang="en-US" sz="2000" dirty="0">
+                <a:latin typeface="Roboto Mono Medium for Powerlin" pitchFamily="2" charset="0"/>
+                <a:ea typeface="Roboto Mono Medium for Powerlin" pitchFamily="2" charset="0"/>
+                <a:cs typeface="Arial" panose="020B0604020202020204" pitchFamily="34" charset="0"/>
+              </a:rPr>
+              <a:t>	</a:t>
+            </a:r>
+            <a:r>
+              <a:rPr lang="en-US" sz="2000" dirty="0" err="1">
+                <a:latin typeface="Roboto Mono Medium for Powerlin" pitchFamily="2" charset="0"/>
+                <a:ea typeface="Roboto Mono Medium for Powerlin" pitchFamily="2" charset="0"/>
+                <a:cs typeface="Arial" panose="020B0604020202020204" pitchFamily="34" charset="0"/>
+              </a:rPr>
+              <a:t>spcNum</a:t>
+            </a:r>
+            <a:r>
+              <a:rPr lang="en-US" sz="2000" dirty="0">
+                <a:latin typeface="Roboto Mono Medium for Powerlin" pitchFamily="2" charset="0"/>
+                <a:ea typeface="Roboto Mono Medium for Powerlin" pitchFamily="2" charset="0"/>
+                <a:cs typeface="Arial" panose="020B0604020202020204" pitchFamily="34" charset="0"/>
+              </a:rPr>
+              <a:t>=2, 				# conditions</a:t>
+            </a:r>
+          </a:p>
+          <a:p>
+            <a:pPr marL="0" indent="0">
+              <a:buNone/>
+            </a:pPr>
+            <a:r>
+              <a:rPr lang="en-US" sz="2000" dirty="0">
+                <a:latin typeface="Roboto Mono Medium for Powerlin" pitchFamily="2" charset="0"/>
+                <a:ea typeface="Roboto Mono Medium for Powerlin" pitchFamily="2" charset="0"/>
+                <a:cs typeface="Arial" panose="020B0604020202020204" pitchFamily="34" charset="0"/>
+              </a:rPr>
+              <a:t>	</a:t>
+            </a:r>
+            <a:r>
+              <a:rPr lang="en-US" sz="2000" dirty="0" err="1">
+                <a:latin typeface="Roboto Mono Medium for Powerlin" pitchFamily="2" charset="0"/>
+                <a:ea typeface="Roboto Mono Medium for Powerlin" pitchFamily="2" charset="0"/>
+                <a:cs typeface="Arial" panose="020B0604020202020204" pitchFamily="34" charset="0"/>
+              </a:rPr>
+              <a:t>Timelength</a:t>
+            </a:r>
+            <a:r>
+              <a:rPr lang="en-US" sz="2000" dirty="0">
+                <a:latin typeface="Roboto Mono Medium for Powerlin" pitchFamily="2" charset="0"/>
+                <a:ea typeface="Roboto Mono Medium for Powerlin" pitchFamily="2" charset="0"/>
+                <a:cs typeface="Arial" panose="020B0604020202020204" pitchFamily="34" charset="0"/>
+              </a:rPr>
+              <a:t>=18, 			# time points</a:t>
+            </a:r>
+          </a:p>
+          <a:p>
+            <a:pPr marL="0" indent="0">
+              <a:buNone/>
+            </a:pPr>
+            <a:r>
+              <a:rPr lang="en-US" sz="2000" dirty="0">
+                <a:latin typeface="Roboto Mono Medium for Powerlin" pitchFamily="2" charset="0"/>
+                <a:ea typeface="Roboto Mono Medium for Powerlin" pitchFamily="2" charset="0"/>
+                <a:cs typeface="Arial" panose="020B0604020202020204" pitchFamily="34" charset="0"/>
+              </a:rPr>
+              <a:t>	Knot=15, 				# knots for spline</a:t>
+            </a:r>
+          </a:p>
+          <a:p>
+            <a:pPr marL="0" indent="0">
+              <a:buNone/>
+            </a:pPr>
+            <a:r>
+              <a:rPr lang="en-US" sz="2000" dirty="0">
+                <a:latin typeface="Roboto Mono Medium for Powerlin" pitchFamily="2" charset="0"/>
+                <a:ea typeface="Roboto Mono Medium for Powerlin" pitchFamily="2" charset="0"/>
+                <a:cs typeface="Arial" panose="020B0604020202020204" pitchFamily="34" charset="0"/>
+              </a:rPr>
+              <a:t>	loop=300, 				# iterations (default=500)</a:t>
+            </a:r>
+          </a:p>
+          <a:p>
+            <a:pPr marL="0" indent="0">
+              <a:buNone/>
+            </a:pPr>
+            <a:r>
+              <a:rPr lang="en-US" sz="2000" dirty="0">
+                <a:latin typeface="Roboto Mono Medium for Powerlin" pitchFamily="2" charset="0"/>
+                <a:ea typeface="Roboto Mono Medium for Powerlin" pitchFamily="2" charset="0"/>
+                <a:cs typeface="Arial" panose="020B0604020202020204" pitchFamily="34" charset="0"/>
+              </a:rPr>
+              <a:t>	</a:t>
+            </a:r>
+            <a:r>
+              <a:rPr lang="en-US" sz="2000" dirty="0" err="1">
+                <a:latin typeface="Roboto Mono Medium for Powerlin" pitchFamily="2" charset="0"/>
+                <a:ea typeface="Roboto Mono Medium for Powerlin" pitchFamily="2" charset="0"/>
+                <a:cs typeface="Arial" panose="020B0604020202020204" pitchFamily="34" charset="0"/>
+              </a:rPr>
+              <a:t>compStart</a:t>
+            </a:r>
+            <a:r>
+              <a:rPr lang="en-US" sz="2000" dirty="0">
+                <a:latin typeface="Roboto Mono Medium for Powerlin" pitchFamily="2" charset="0"/>
+                <a:ea typeface="Roboto Mono Medium for Powerlin" pitchFamily="2" charset="0"/>
+                <a:cs typeface="Arial" panose="020B0604020202020204" pitchFamily="34" charset="0"/>
+              </a:rPr>
+              <a:t>=200, 			# begin comparisons</a:t>
+            </a:r>
+          </a:p>
+          <a:p>
+            <a:pPr marL="0" indent="0">
+              <a:buNone/>
+            </a:pPr>
+            <a:r>
+              <a:rPr lang="en-US" sz="2000" dirty="0">
+                <a:latin typeface="Roboto Mono Medium for Powerlin" pitchFamily="2" charset="0"/>
+                <a:ea typeface="Roboto Mono Medium for Powerlin" pitchFamily="2" charset="0"/>
+                <a:cs typeface="Arial" panose="020B0604020202020204" pitchFamily="34" charset="0"/>
+              </a:rPr>
+              <a:t>	</a:t>
+            </a:r>
+            <a:r>
+              <a:rPr lang="en-US" sz="2000" dirty="0" err="1">
+                <a:latin typeface="Roboto Mono Medium for Powerlin" pitchFamily="2" charset="0"/>
+                <a:ea typeface="Roboto Mono Medium for Powerlin" pitchFamily="2" charset="0"/>
+                <a:cs typeface="Arial" panose="020B0604020202020204" pitchFamily="34" charset="0"/>
+              </a:rPr>
+              <a:t>compInterval</a:t>
+            </a:r>
+            <a:r>
+              <a:rPr lang="en-US" sz="2000" dirty="0">
+                <a:latin typeface="Roboto Mono Medium for Powerlin" pitchFamily="2" charset="0"/>
+                <a:ea typeface="Roboto Mono Medium for Powerlin" pitchFamily="2" charset="0"/>
+                <a:cs typeface="Arial" panose="020B0604020202020204" pitchFamily="34" charset="0"/>
+              </a:rPr>
+              <a:t>=100, 		# interval </a:t>
+            </a:r>
+            <a:r>
+              <a:rPr lang="en-US" sz="2000" dirty="0" err="1">
+                <a:latin typeface="Roboto Mono Medium for Powerlin" pitchFamily="2" charset="0"/>
+                <a:ea typeface="Roboto Mono Medium for Powerlin" pitchFamily="2" charset="0"/>
+                <a:cs typeface="Arial" panose="020B0604020202020204" pitchFamily="34" charset="0"/>
+              </a:rPr>
+              <a:t>betw</a:t>
+            </a:r>
+            <a:r>
+              <a:rPr lang="en-US" sz="2000" dirty="0">
+                <a:latin typeface="Roboto Mono Medium for Powerlin" pitchFamily="2" charset="0"/>
+                <a:ea typeface="Roboto Mono Medium for Powerlin" pitchFamily="2" charset="0"/>
+                <a:cs typeface="Arial" panose="020B0604020202020204" pitchFamily="34" charset="0"/>
+              </a:rPr>
+              <a:t>. results</a:t>
+            </a:r>
+          </a:p>
+          <a:p>
+            <a:pPr marL="0" indent="0">
+              <a:buNone/>
+            </a:pPr>
+            <a:r>
+              <a:rPr lang="en-US" sz="2000" dirty="0">
+                <a:latin typeface="Roboto Mono Medium for Powerlin" pitchFamily="2" charset="0"/>
+                <a:ea typeface="Roboto Mono Medium for Powerlin" pitchFamily="2" charset="0"/>
+                <a:cs typeface="Arial" panose="020B0604020202020204" pitchFamily="34" charset="0"/>
+              </a:rPr>
+              <a:t>	alpha=50				# cluster strength </a:t>
+            </a:r>
+          </a:p>
+          <a:p>
+            <a:pPr marL="0" indent="0">
+              <a:buNone/>
+            </a:pPr>
+            <a:r>
+              <a:rPr lang="en-US" sz="2000" dirty="0">
+                <a:latin typeface="Roboto Mono Medium for Powerlin" pitchFamily="2" charset="0"/>
+                <a:ea typeface="Roboto Mono Medium for Powerlin" pitchFamily="2" charset="0"/>
+                <a:cs typeface="Arial" panose="020B0604020202020204" pitchFamily="34" charset="0"/>
+              </a:rPr>
+              <a:t>	);</a:t>
+            </a:r>
+          </a:p>
+        </p:txBody>
+      </p:sp>
+    </p:spTree>
+    <p:extLst>
+      <p:ext uri="{BB962C8B-B14F-4D97-AF65-F5344CB8AC3E}">
+        <p14:creationId xmlns:p14="http://schemas.microsoft.com/office/powerpoint/2010/main" val="378366919"/>
+      </p:ext>
+    </p:extLst>
+  </p:cSld>
+  <p:clrMapOvr>
+    <a:masterClrMapping/>
+  </p:clrMapOvr>
+</p:sld>
+</file>
+
+<file path=ppt/slides/slide16.xml><?xml version="1.0" encoding="utf-8"?>
 <p:sld xmlns:a="http://schemas.openxmlformats.org/drawingml/2006/main" xmlns:r="http://schemas.openxmlformats.org/officeDocument/2006/relationships" xmlns:p="http://schemas.openxmlformats.org/presentationml/2006/main">
   <p:cSld>
     <p:spTree>
@@ -9007,34 +10275,47 @@
           <p:cNvGraphicFramePr>
             <a:graphicFrameLocks noGrp="1"/>
           </p:cNvGraphicFramePr>
-          <p:nvPr/>
+          <p:nvPr>
+            <p:extLst>
+              <p:ext uri="{D42A27DB-BD31-4B8C-83A1-F6EECF244321}">
+                <p14:modId xmlns:p14="http://schemas.microsoft.com/office/powerpoint/2010/main" val="4039874619"/>
+              </p:ext>
+            </p:extLst>
+          </p:nvPr>
         </p:nvGraphicFramePr>
         <p:xfrm>
-          <a:off x="1651000" y="1227666"/>
-          <a:ext cx="6603999" cy="2966720"/>
+          <a:off x="825011" y="1403839"/>
+          <a:ext cx="8255977" cy="5181600"/>
         </p:xfrm>
         <a:graphic>
           <a:graphicData uri="http://schemas.openxmlformats.org/drawingml/2006/table">
             <a:tbl>
               <a:tblPr firstRow="1" bandRow="1">
-                <a:tableStyleId>{5C22544A-7EE6-4342-B048-85BDC9FD1C3A}</a:tableStyleId>
+                <a:tableStyleId>{7DF18680-E054-41AD-8BC1-D1AEF772440D}</a:tableStyleId>
               </a:tblPr>
               <a:tblGrid>
-                <a:gridCol w="2201333">
+                <a:gridCol w="1318846">
                   <a:extLst>
                     <a:ext uri="{9D8B030D-6E8A-4147-A177-3AD203B41FA5}">
                       <a16:colId xmlns:a16="http://schemas.microsoft.com/office/drawing/2014/main" val="1296335350"/>
                     </a:ext>
                   </a:extLst>
                 </a:gridCol>
-                <a:gridCol w="2201333">
+                <a:gridCol w="1758462">
+                  <a:extLst>
+                    <a:ext uri="{9D8B030D-6E8A-4147-A177-3AD203B41FA5}">
+                      <a16:colId xmlns:a16="http://schemas.microsoft.com/office/drawing/2014/main" val="4278330896"/>
+                    </a:ext>
+                  </a:extLst>
+                </a:gridCol>
+                <a:gridCol w="2969596">
                   <a:extLst>
                     <a:ext uri="{9D8B030D-6E8A-4147-A177-3AD203B41FA5}">
                       <a16:colId xmlns:a16="http://schemas.microsoft.com/office/drawing/2014/main" val="463003195"/>
                     </a:ext>
                   </a:extLst>
                 </a:gridCol>
-                <a:gridCol w="2201333">
+                <a:gridCol w="2209073">
                   <a:extLst>
                     <a:ext uri="{9D8B030D-6E8A-4147-A177-3AD203B41FA5}">
                       <a16:colId xmlns:a16="http://schemas.microsoft.com/office/drawing/2014/main" val="2185225880"/>
@@ -9048,30 +10329,104 @@
                     <a:bodyPr/>
                     <a:lstStyle/>
                     <a:p>
-                      <a:endParaRPr lang="en-US" dirty="0"/>
+                      <a:pPr algn="l" fontAlgn="b"/>
+                      <a:r>
+                        <a:rPr lang="en-US" sz="2000" u="none" strike="noStrike" dirty="0">
+                          <a:effectLst/>
+                          <a:latin typeface="Arial" panose="020B0604020202020204" pitchFamily="34" charset="0"/>
+                          <a:cs typeface="Arial" panose="020B0604020202020204" pitchFamily="34" charset="0"/>
+                        </a:rPr>
+                        <a:t>Entrez ID</a:t>
+                      </a:r>
+                      <a:endParaRPr lang="en-US" sz="2000" b="0" i="0" u="none" strike="noStrike" dirty="0">
+                        <a:solidFill>
+                          <a:srgbClr val="000000"/>
+                        </a:solidFill>
+                        <a:effectLst/>
+                        <a:latin typeface="Arial" panose="020B0604020202020204" pitchFamily="34" charset="0"/>
+                        <a:cs typeface="Arial" panose="020B0604020202020204" pitchFamily="34" charset="0"/>
+                      </a:endParaRPr>
                     </a:p>
                   </a:txBody>
-                  <a:tcPr/>
+                  <a:tcPr marL="45720" marR="45720" anchor="b"/>
                 </a:tc>
                 <a:tc>
                   <a:txBody>
                     <a:bodyPr/>
                     <a:lstStyle/>
                     <a:p>
-                      <a:endParaRPr lang="en-US"/>
+                      <a:pPr algn="l" fontAlgn="b"/>
+                      <a:r>
+                        <a:rPr lang="en-US" sz="2000" u="none" strike="noStrike">
+                          <a:effectLst/>
+                          <a:latin typeface="Arial" panose="020B0604020202020204" pitchFamily="34" charset="0"/>
+                          <a:cs typeface="Arial" panose="020B0604020202020204" pitchFamily="34" charset="0"/>
+                        </a:rPr>
+                        <a:t>Gene Symbol</a:t>
+                      </a:r>
+                      <a:endParaRPr lang="en-US" sz="2000" b="0" i="0" u="none" strike="noStrike">
+                        <a:solidFill>
+                          <a:srgbClr val="000000"/>
+                        </a:solidFill>
+                        <a:effectLst/>
+                        <a:latin typeface="Arial" panose="020B0604020202020204" pitchFamily="34" charset="0"/>
+                        <a:cs typeface="Arial" panose="020B0604020202020204" pitchFamily="34" charset="0"/>
+                      </a:endParaRPr>
                     </a:p>
                   </a:txBody>
-                  <a:tcPr/>
+                  <a:tcPr marL="45720" marR="45720" anchor="b"/>
                 </a:tc>
                 <a:tc>
                   <a:txBody>
                     <a:bodyPr/>
                     <a:lstStyle/>
                     <a:p>
-                      <a:endParaRPr lang="en-US"/>
+                      <a:pPr algn="l" fontAlgn="b"/>
+                      <a:r>
+                        <a:rPr lang="en-US" sz="2000" u="none" strike="noStrike">
+                          <a:effectLst/>
+                          <a:latin typeface="Arial" panose="020B0604020202020204" pitchFamily="34" charset="0"/>
+                          <a:cs typeface="Arial" panose="020B0604020202020204" pitchFamily="34" charset="0"/>
+                        </a:rPr>
+                        <a:t>Description</a:t>
+                      </a:r>
+                      <a:endParaRPr lang="en-US" sz="2000" b="0" i="0" u="none" strike="noStrike">
+                        <a:solidFill>
+                          <a:srgbClr val="000000"/>
+                        </a:solidFill>
+                        <a:effectLst/>
+                        <a:latin typeface="Arial" panose="020B0604020202020204" pitchFamily="34" charset="0"/>
+                        <a:cs typeface="Arial" panose="020B0604020202020204" pitchFamily="34" charset="0"/>
+                      </a:endParaRPr>
                     </a:p>
                   </a:txBody>
-                  <a:tcPr/>
+                  <a:tcPr marL="45720" marR="45720" anchor="b"/>
+                </a:tc>
+                <a:tc>
+                  <a:txBody>
+                    <a:bodyPr/>
+                    <a:lstStyle/>
+                    <a:p>
+                      <a:pPr algn="l" fontAlgn="b"/>
+                      <a:r>
+                        <a:rPr lang="en-US" sz="2000" u="none" strike="noStrike">
+                          <a:effectLst/>
+                          <a:latin typeface="Arial" panose="020B0604020202020204" pitchFamily="34" charset="0"/>
+                          <a:cs typeface="Arial" panose="020B0604020202020204" pitchFamily="34" charset="0"/>
+                        </a:rPr>
+                        <a:t>Previous cancer studies?</a:t>
+                      </a:r>
+                      <a:endParaRPr lang="en-US" sz="2000" b="0" i="0" u="none" strike="noStrike">
+                        <a:solidFill>
+                          <a:srgbClr val="000000"/>
+                        </a:solidFill>
+                        <a:effectLst/>
+                        <a:latin typeface="Arial" panose="020B0604020202020204" pitchFamily="34" charset="0"/>
+                        <a:cs typeface="Arial" panose="020B0604020202020204" pitchFamily="34" charset="0"/>
+                      </a:endParaRPr>
+                    </a:p>
+                  </a:txBody>
+                  <a:tcPr marL="45720" marR="45720" anchor="b"/>
                 </a:tc>
                 <a:extLst>
                   <a:ext uri="{0D108BD9-81ED-4DB2-BD59-A6C34878D82A}">
@@ -9085,30 +10440,326 @@
                     <a:bodyPr/>
                     <a:lstStyle/>
                     <a:p>
-                      <a:endParaRPr lang="en-US" dirty="0"/>
+                      <a:pPr algn="l" fontAlgn="b"/>
+                      <a:r>
+                        <a:rPr lang="en-US" sz="2000" u="none" strike="noStrike" dirty="0">
+                          <a:effectLst/>
+                          <a:latin typeface="Arial" panose="020B0604020202020204" pitchFamily="34" charset="0"/>
+                          <a:cs typeface="Arial" panose="020B0604020202020204" pitchFamily="34" charset="0"/>
+                        </a:rPr>
+                        <a:t>3861</a:t>
+                      </a:r>
+                      <a:endParaRPr lang="en-US" sz="2000" b="0" i="0" u="none" strike="noStrike" dirty="0">
+                        <a:solidFill>
+                          <a:srgbClr val="000000"/>
+                        </a:solidFill>
+                        <a:effectLst/>
+                        <a:latin typeface="Arial" panose="020B0604020202020204" pitchFamily="34" charset="0"/>
+                        <a:cs typeface="Arial" panose="020B0604020202020204" pitchFamily="34" charset="0"/>
+                      </a:endParaRPr>
                     </a:p>
                   </a:txBody>
-                  <a:tcPr/>
+                  <a:tcPr marL="45720" marR="45720" anchor="b"/>
                 </a:tc>
                 <a:tc>
                   <a:txBody>
                     <a:bodyPr/>
                     <a:lstStyle/>
                     <a:p>
-                      <a:endParaRPr lang="en-US"/>
+                      <a:pPr algn="l" fontAlgn="b"/>
+                      <a:r>
+                        <a:rPr lang="en-US" sz="2000" u="none" strike="noStrike">
+                          <a:effectLst/>
+                          <a:latin typeface="Arial" panose="020B0604020202020204" pitchFamily="34" charset="0"/>
+                          <a:cs typeface="Arial" panose="020B0604020202020204" pitchFamily="34" charset="0"/>
+                        </a:rPr>
+                        <a:t>KRT14</a:t>
+                      </a:r>
+                      <a:endParaRPr lang="en-US" sz="2000" b="0" i="0" u="none" strike="noStrike">
+                        <a:solidFill>
+                          <a:srgbClr val="000000"/>
+                        </a:solidFill>
+                        <a:effectLst/>
+                        <a:latin typeface="Arial" panose="020B0604020202020204" pitchFamily="34" charset="0"/>
+                        <a:cs typeface="Arial" panose="020B0604020202020204" pitchFamily="34" charset="0"/>
+                      </a:endParaRPr>
                     </a:p>
                   </a:txBody>
-                  <a:tcPr/>
+                  <a:tcPr marL="45720" marR="45720" anchor="b"/>
                 </a:tc>
                 <a:tc>
                   <a:txBody>
                     <a:bodyPr/>
                     <a:lstStyle/>
                     <a:p>
-                      <a:endParaRPr lang="en-US"/>
+                      <a:pPr algn="l" fontAlgn="b"/>
+                      <a:r>
+                        <a:rPr lang="en-US" sz="2000" u="none" strike="noStrike">
+                          <a:effectLst/>
+                          <a:latin typeface="Arial" panose="020B0604020202020204" pitchFamily="34" charset="0"/>
+                          <a:cs typeface="Arial" panose="020B0604020202020204" pitchFamily="34" charset="0"/>
+                        </a:rPr>
+                        <a:t>Epithelial cell cytoskeleton</a:t>
+                      </a:r>
+                      <a:endParaRPr lang="en-US" sz="2000" b="0" i="0" u="none" strike="noStrike">
+                        <a:solidFill>
+                          <a:srgbClr val="000000"/>
+                        </a:solidFill>
+                        <a:effectLst/>
+                        <a:latin typeface="Arial" panose="020B0604020202020204" pitchFamily="34" charset="0"/>
+                        <a:cs typeface="Arial" panose="020B0604020202020204" pitchFamily="34" charset="0"/>
+                      </a:endParaRPr>
                     </a:p>
                   </a:txBody>
-                  <a:tcPr/>
+                  <a:tcPr marL="45720" marR="45720" anchor="b"/>
+                </a:tc>
+                <a:tc>
+                  <a:txBody>
+                    <a:bodyPr/>
+                    <a:lstStyle/>
+                    <a:p>
+                      <a:pPr algn="l" fontAlgn="b"/>
+                      <a:r>
+                        <a:rPr lang="en-US" sz="2000" u="none" strike="noStrike">
+                          <a:effectLst/>
+                          <a:latin typeface="Arial" panose="020B0604020202020204" pitchFamily="34" charset="0"/>
+                          <a:cs typeface="Arial" panose="020B0604020202020204" pitchFamily="34" charset="0"/>
+                        </a:rPr>
+                        <a:t>Yes</a:t>
+                      </a:r>
+                      <a:endParaRPr lang="en-US" sz="2000" b="0" i="0" u="none" strike="noStrike">
+                        <a:solidFill>
+                          <a:srgbClr val="000000"/>
+                        </a:solidFill>
+                        <a:effectLst/>
+                        <a:latin typeface="Arial" panose="020B0604020202020204" pitchFamily="34" charset="0"/>
+                        <a:cs typeface="Arial" panose="020B0604020202020204" pitchFamily="34" charset="0"/>
+                      </a:endParaRPr>
+                    </a:p>
+                  </a:txBody>
+                  <a:tcPr marL="45720" marR="45720" anchor="b"/>
+                </a:tc>
+                <a:extLst>
+                  <a:ext uri="{0D108BD9-81ED-4DB2-BD59-A6C34878D82A}">
+                    <a16:rowId xmlns:a16="http://schemas.microsoft.com/office/drawing/2014/main" val="58739192"/>
+                  </a:ext>
+                </a:extLst>
+              </a:tr>
+              <a:tr h="370840">
+                <a:tc>
+                  <a:txBody>
+                    <a:bodyPr/>
+                    <a:lstStyle/>
+                    <a:p>
+                      <a:pPr algn="l" fontAlgn="b"/>
+                      <a:r>
+                        <a:rPr lang="en-US" sz="2000" u="none" strike="noStrike" dirty="0">
+                          <a:effectLst/>
+                          <a:latin typeface="Arial" panose="020B0604020202020204" pitchFamily="34" charset="0"/>
+                          <a:cs typeface="Arial" panose="020B0604020202020204" pitchFamily="34" charset="0"/>
+                        </a:rPr>
+                        <a:t>4536</a:t>
+                      </a:r>
+                      <a:endParaRPr lang="en-US" sz="2000" b="0" i="0" u="none" strike="noStrike" dirty="0">
+                        <a:solidFill>
+                          <a:srgbClr val="000000"/>
+                        </a:solidFill>
+                        <a:effectLst/>
+                        <a:latin typeface="Arial" panose="020B0604020202020204" pitchFamily="34" charset="0"/>
+                        <a:cs typeface="Arial" panose="020B0604020202020204" pitchFamily="34" charset="0"/>
+                      </a:endParaRPr>
+                    </a:p>
+                  </a:txBody>
+                  <a:tcPr marL="45720" marR="45720" anchor="b"/>
+                </a:tc>
+                <a:tc>
+                  <a:txBody>
+                    <a:bodyPr/>
+                    <a:lstStyle/>
+                    <a:p>
+                      <a:pPr algn="l" fontAlgn="b"/>
+                      <a:r>
+                        <a:rPr lang="en-US" sz="2000" u="none" strike="noStrike" dirty="0">
+                          <a:effectLst/>
+                          <a:latin typeface="Arial" panose="020B0604020202020204" pitchFamily="34" charset="0"/>
+                          <a:cs typeface="Arial" panose="020B0604020202020204" pitchFamily="34" charset="0"/>
+                        </a:rPr>
+                        <a:t>MT-ND2</a:t>
+                      </a:r>
+                      <a:endParaRPr lang="en-US" sz="2000" b="0" i="0" u="none" strike="noStrike" dirty="0">
+                        <a:solidFill>
+                          <a:srgbClr val="000000"/>
+                        </a:solidFill>
+                        <a:effectLst/>
+                        <a:latin typeface="Arial" panose="020B0604020202020204" pitchFamily="34" charset="0"/>
+                        <a:cs typeface="Arial" panose="020B0604020202020204" pitchFamily="34" charset="0"/>
+                      </a:endParaRPr>
+                    </a:p>
+                  </a:txBody>
+                  <a:tcPr marL="45720" marR="45720" anchor="b"/>
+                </a:tc>
+                <a:tc>
+                  <a:txBody>
+                    <a:bodyPr/>
+                    <a:lstStyle/>
+                    <a:p>
+                      <a:pPr algn="l" fontAlgn="b"/>
+                      <a:r>
+                        <a:rPr lang="en-US" sz="2000" u="none" strike="noStrike">
+                          <a:effectLst/>
+                          <a:latin typeface="Arial" panose="020B0604020202020204" pitchFamily="34" charset="0"/>
+                          <a:cs typeface="Arial" panose="020B0604020202020204" pitchFamily="34" charset="0"/>
+                        </a:rPr>
+                        <a:t>Mitochondrially encoded NADH dehydrogenase 2</a:t>
+                      </a:r>
+                      <a:endParaRPr lang="en-US" sz="2000" b="0" i="0" u="none" strike="noStrike">
+                        <a:solidFill>
+                          <a:srgbClr val="000000"/>
+                        </a:solidFill>
+                        <a:effectLst/>
+                        <a:latin typeface="Arial" panose="020B0604020202020204" pitchFamily="34" charset="0"/>
+                        <a:cs typeface="Arial" panose="020B0604020202020204" pitchFamily="34" charset="0"/>
+                      </a:endParaRPr>
+                    </a:p>
+                  </a:txBody>
+                  <a:tcPr marL="45720" marR="45720" anchor="b"/>
+                </a:tc>
+                <a:tc>
+                  <a:txBody>
+                    <a:bodyPr/>
+                    <a:lstStyle/>
+                    <a:p>
+                      <a:pPr algn="l" fontAlgn="b"/>
+                      <a:r>
+                        <a:rPr lang="en-US" sz="2000" u="none" strike="noStrike">
+                          <a:effectLst/>
+                          <a:latin typeface="Arial" panose="020B0604020202020204" pitchFamily="34" charset="0"/>
+                          <a:cs typeface="Arial" panose="020B0604020202020204" pitchFamily="34" charset="0"/>
+                        </a:rPr>
+                        <a:t>Yes</a:t>
+                      </a:r>
+                      <a:endParaRPr lang="en-US" sz="2000" b="0" i="0" u="none" strike="noStrike">
+                        <a:solidFill>
+                          <a:srgbClr val="000000"/>
+                        </a:solidFill>
+                        <a:effectLst/>
+                        <a:latin typeface="Arial" panose="020B0604020202020204" pitchFamily="34" charset="0"/>
+                        <a:cs typeface="Arial" panose="020B0604020202020204" pitchFamily="34" charset="0"/>
+                      </a:endParaRPr>
+                    </a:p>
+                  </a:txBody>
+                  <a:tcPr marL="45720" marR="45720" anchor="b"/>
+                </a:tc>
+                <a:extLst>
+                  <a:ext uri="{0D108BD9-81ED-4DB2-BD59-A6C34878D82A}">
+                    <a16:rowId xmlns:a16="http://schemas.microsoft.com/office/drawing/2014/main" val="2558668695"/>
+                  </a:ext>
+                </a:extLst>
+              </a:tr>
+              <a:tr h="370840">
+                <a:tc>
+                  <a:txBody>
+                    <a:bodyPr/>
+                    <a:lstStyle/>
+                    <a:p>
+                      <a:pPr algn="l" fontAlgn="b"/>
+                      <a:r>
+                        <a:rPr lang="en-US" sz="2000" u="none" strike="noStrike" dirty="0">
+                          <a:effectLst/>
+                          <a:latin typeface="Arial" panose="020B0604020202020204" pitchFamily="34" charset="0"/>
+                          <a:cs typeface="Arial" panose="020B0604020202020204" pitchFamily="34" charset="0"/>
+                        </a:rPr>
+                        <a:t>6319</a:t>
+                      </a:r>
+                      <a:endParaRPr lang="en-US" sz="2000" b="0" i="0" u="none" strike="noStrike" dirty="0">
+                        <a:solidFill>
+                          <a:srgbClr val="000000"/>
+                        </a:solidFill>
+                        <a:effectLst/>
+                        <a:latin typeface="Arial" panose="020B0604020202020204" pitchFamily="34" charset="0"/>
+                        <a:cs typeface="Arial" panose="020B0604020202020204" pitchFamily="34" charset="0"/>
+                      </a:endParaRPr>
+                    </a:p>
+                  </a:txBody>
+                  <a:tcPr marL="45720" marR="45720" anchor="b"/>
+                </a:tc>
+                <a:tc>
+                  <a:txBody>
+                    <a:bodyPr/>
+                    <a:lstStyle/>
+                    <a:p>
+                      <a:pPr algn="l" fontAlgn="b"/>
+                      <a:r>
+                        <a:rPr lang="en-US" sz="2000" u="none" strike="noStrike" dirty="0">
+                          <a:effectLst/>
+                          <a:latin typeface="Arial" panose="020B0604020202020204" pitchFamily="34" charset="0"/>
+                          <a:cs typeface="Arial" panose="020B0604020202020204" pitchFamily="34" charset="0"/>
+                        </a:rPr>
+                        <a:t>SCD</a:t>
+                      </a:r>
+                      <a:endParaRPr lang="en-US" sz="2000" b="0" i="0" u="none" strike="noStrike" dirty="0">
+                        <a:solidFill>
+                          <a:srgbClr val="000000"/>
+                        </a:solidFill>
+                        <a:effectLst/>
+                        <a:latin typeface="Arial" panose="020B0604020202020204" pitchFamily="34" charset="0"/>
+                        <a:cs typeface="Arial" panose="020B0604020202020204" pitchFamily="34" charset="0"/>
+                      </a:endParaRPr>
+                    </a:p>
+                  </a:txBody>
+                  <a:tcPr marL="45720" marR="45720" anchor="b"/>
+                </a:tc>
+                <a:tc>
+                  <a:txBody>
+                    <a:bodyPr/>
+                    <a:lstStyle/>
+                    <a:p>
+                      <a:pPr algn="l" fontAlgn="b"/>
+                      <a:r>
+                        <a:rPr lang="en-US" sz="2000" u="none" strike="noStrike">
+                          <a:effectLst/>
+                          <a:latin typeface="Arial" panose="020B0604020202020204" pitchFamily="34" charset="0"/>
+                          <a:cs typeface="Arial" panose="020B0604020202020204" pitchFamily="34" charset="0"/>
+                        </a:rPr>
+                        <a:t>Fatty acid biosynthesis</a:t>
+                      </a:r>
+                      <a:endParaRPr lang="en-US" sz="2000" b="0" i="0" u="none" strike="noStrike">
+                        <a:solidFill>
+                          <a:srgbClr val="000000"/>
+                        </a:solidFill>
+                        <a:effectLst/>
+                        <a:latin typeface="Arial" panose="020B0604020202020204" pitchFamily="34" charset="0"/>
+                        <a:cs typeface="Arial" panose="020B0604020202020204" pitchFamily="34" charset="0"/>
+                      </a:endParaRPr>
+                    </a:p>
+                  </a:txBody>
+                  <a:tcPr marL="45720" marR="45720" anchor="b"/>
+                </a:tc>
+                <a:tc>
+                  <a:txBody>
+                    <a:bodyPr/>
+                    <a:lstStyle/>
+                    <a:p>
+                      <a:pPr algn="l" fontAlgn="b"/>
+                      <a:r>
+                        <a:rPr lang="en-US" sz="2000" u="none" strike="noStrike">
+                          <a:effectLst/>
+                          <a:latin typeface="Arial" panose="020B0604020202020204" pitchFamily="34" charset="0"/>
+                          <a:cs typeface="Arial" panose="020B0604020202020204" pitchFamily="34" charset="0"/>
+                        </a:rPr>
+                        <a:t>Yes</a:t>
+                      </a:r>
+                      <a:endParaRPr lang="en-US" sz="2000" b="0" i="0" u="none" strike="noStrike">
+                        <a:solidFill>
+                          <a:srgbClr val="000000"/>
+                        </a:solidFill>
+                        <a:effectLst/>
+                        <a:latin typeface="Arial" panose="020B0604020202020204" pitchFamily="34" charset="0"/>
+                        <a:cs typeface="Arial" panose="020B0604020202020204" pitchFamily="34" charset="0"/>
+                      </a:endParaRPr>
+                    </a:p>
+                  </a:txBody>
+                  <a:tcPr marL="45720" marR="45720" anchor="b"/>
                 </a:tc>
                 <a:extLst>
                   <a:ext uri="{0D108BD9-81ED-4DB2-BD59-A6C34878D82A}">
@@ -9122,30 +10773,104 @@
                     <a:bodyPr/>
                     <a:lstStyle/>
                     <a:p>
-                      <a:endParaRPr lang="en-US"/>
+                      <a:pPr algn="l" fontAlgn="b"/>
+                      <a:r>
+                        <a:rPr lang="en-US" sz="2000" u="none" strike="noStrike" dirty="0">
+                          <a:effectLst/>
+                          <a:latin typeface="Arial" panose="020B0604020202020204" pitchFamily="34" charset="0"/>
+                          <a:cs typeface="Arial" panose="020B0604020202020204" pitchFamily="34" charset="0"/>
+                        </a:rPr>
+                        <a:t>667</a:t>
+                      </a:r>
+                      <a:endParaRPr lang="en-US" sz="2000" b="0" i="0" u="none" strike="noStrike" dirty="0">
+                        <a:solidFill>
+                          <a:srgbClr val="000000"/>
+                        </a:solidFill>
+                        <a:effectLst/>
+                        <a:latin typeface="Arial" panose="020B0604020202020204" pitchFamily="34" charset="0"/>
+                        <a:cs typeface="Arial" panose="020B0604020202020204" pitchFamily="34" charset="0"/>
+                      </a:endParaRPr>
                     </a:p>
                   </a:txBody>
-                  <a:tcPr/>
+                  <a:tcPr marL="45720" marR="45720" anchor="b"/>
                 </a:tc>
                 <a:tc>
                   <a:txBody>
                     <a:bodyPr/>
                     <a:lstStyle/>
                     <a:p>
-                      <a:endParaRPr lang="en-US"/>
+                      <a:pPr algn="l" fontAlgn="b"/>
+                      <a:r>
+                        <a:rPr lang="en-US" sz="2000" u="none" strike="noStrike" dirty="0">
+                          <a:effectLst/>
+                          <a:latin typeface="Arial" panose="020B0604020202020204" pitchFamily="34" charset="0"/>
+                          <a:cs typeface="Arial" panose="020B0604020202020204" pitchFamily="34" charset="0"/>
+                        </a:rPr>
+                        <a:t>DST</a:t>
+                      </a:r>
+                      <a:endParaRPr lang="en-US" sz="2000" b="0" i="0" u="none" strike="noStrike" dirty="0">
+                        <a:solidFill>
+                          <a:srgbClr val="000000"/>
+                        </a:solidFill>
+                        <a:effectLst/>
+                        <a:latin typeface="Arial" panose="020B0604020202020204" pitchFamily="34" charset="0"/>
+                        <a:cs typeface="Arial" panose="020B0604020202020204" pitchFamily="34" charset="0"/>
+                      </a:endParaRPr>
                     </a:p>
                   </a:txBody>
-                  <a:tcPr/>
+                  <a:tcPr marL="45720" marR="45720" anchor="b"/>
                 </a:tc>
                 <a:tc>
                   <a:txBody>
                     <a:bodyPr/>
                     <a:lstStyle/>
                     <a:p>
-                      <a:endParaRPr lang="en-US"/>
+                      <a:pPr algn="l" fontAlgn="b"/>
+                      <a:r>
+                        <a:rPr lang="en-US" sz="2000" u="none" strike="noStrike" dirty="0">
+                          <a:effectLst/>
+                          <a:latin typeface="Arial" panose="020B0604020202020204" pitchFamily="34" charset="0"/>
+                          <a:cs typeface="Arial" panose="020B0604020202020204" pitchFamily="34" charset="0"/>
+                        </a:rPr>
+                        <a:t>Adhesion junction plaque</a:t>
+                      </a:r>
+                      <a:endParaRPr lang="en-US" sz="2000" b="0" i="0" u="none" strike="noStrike" dirty="0">
+                        <a:solidFill>
+                          <a:srgbClr val="000000"/>
+                        </a:solidFill>
+                        <a:effectLst/>
+                        <a:latin typeface="Arial" panose="020B0604020202020204" pitchFamily="34" charset="0"/>
+                        <a:cs typeface="Arial" panose="020B0604020202020204" pitchFamily="34" charset="0"/>
+                      </a:endParaRPr>
                     </a:p>
                   </a:txBody>
-                  <a:tcPr/>
+                  <a:tcPr marL="45720" marR="45720" anchor="b"/>
+                </a:tc>
+                <a:tc>
+                  <a:txBody>
+                    <a:bodyPr/>
+                    <a:lstStyle/>
+                    <a:p>
+                      <a:pPr algn="l" fontAlgn="b"/>
+                      <a:r>
+                        <a:rPr lang="en-US" sz="2000" u="none" strike="noStrike">
+                          <a:effectLst/>
+                          <a:latin typeface="Arial" panose="020B0604020202020204" pitchFamily="34" charset="0"/>
+                          <a:cs typeface="Arial" panose="020B0604020202020204" pitchFamily="34" charset="0"/>
+                        </a:rPr>
+                        <a:t>No</a:t>
+                      </a:r>
+                      <a:endParaRPr lang="en-US" sz="2000" b="0" i="0" u="none" strike="noStrike">
+                        <a:solidFill>
+                          <a:srgbClr val="000000"/>
+                        </a:solidFill>
+                        <a:effectLst/>
+                        <a:latin typeface="Arial" panose="020B0604020202020204" pitchFamily="34" charset="0"/>
+                        <a:cs typeface="Arial" panose="020B0604020202020204" pitchFamily="34" charset="0"/>
+                      </a:endParaRPr>
+                    </a:p>
+                  </a:txBody>
+                  <a:tcPr marL="45720" marR="45720" anchor="b"/>
                 </a:tc>
                 <a:extLst>
                   <a:ext uri="{0D108BD9-81ED-4DB2-BD59-A6C34878D82A}">
@@ -9159,30 +10884,104 @@
                     <a:bodyPr/>
                     <a:lstStyle/>
                     <a:p>
-                      <a:endParaRPr lang="en-US"/>
+                      <a:pPr algn="l" fontAlgn="b"/>
+                      <a:r>
+                        <a:rPr lang="en-US" sz="2000" u="none" strike="noStrike" dirty="0">
+                          <a:effectLst/>
+                          <a:latin typeface="Arial" panose="020B0604020202020204" pitchFamily="34" charset="0"/>
+                          <a:cs typeface="Arial" panose="020B0604020202020204" pitchFamily="34" charset="0"/>
+                        </a:rPr>
+                        <a:t>7812</a:t>
+                      </a:r>
+                      <a:endParaRPr lang="en-US" sz="2000" b="0" i="0" u="none" strike="noStrike" dirty="0">
+                        <a:solidFill>
+                          <a:srgbClr val="000000"/>
+                        </a:solidFill>
+                        <a:effectLst/>
+                        <a:latin typeface="Arial" panose="020B0604020202020204" pitchFamily="34" charset="0"/>
+                        <a:cs typeface="Arial" panose="020B0604020202020204" pitchFamily="34" charset="0"/>
+                      </a:endParaRPr>
                     </a:p>
                   </a:txBody>
-                  <a:tcPr/>
+                  <a:tcPr marL="45720" marR="45720" anchor="b"/>
                 </a:tc>
                 <a:tc>
                   <a:txBody>
                     <a:bodyPr/>
                     <a:lstStyle/>
                     <a:p>
-                      <a:endParaRPr lang="en-US"/>
+                      <a:pPr algn="l" fontAlgn="b"/>
+                      <a:r>
+                        <a:rPr lang="en-US" sz="2000" u="none" strike="noStrike">
+                          <a:effectLst/>
+                          <a:latin typeface="Arial" panose="020B0604020202020204" pitchFamily="34" charset="0"/>
+                          <a:cs typeface="Arial" panose="020B0604020202020204" pitchFamily="34" charset="0"/>
+                        </a:rPr>
+                        <a:t>CSDE1</a:t>
+                      </a:r>
+                      <a:endParaRPr lang="en-US" sz="2000" b="0" i="0" u="none" strike="noStrike">
+                        <a:solidFill>
+                          <a:srgbClr val="000000"/>
+                        </a:solidFill>
+                        <a:effectLst/>
+                        <a:latin typeface="Arial" panose="020B0604020202020204" pitchFamily="34" charset="0"/>
+                        <a:cs typeface="Arial" panose="020B0604020202020204" pitchFamily="34" charset="0"/>
+                      </a:endParaRPr>
                     </a:p>
                   </a:txBody>
-                  <a:tcPr/>
+                  <a:tcPr marL="45720" marR="45720" anchor="b"/>
                 </a:tc>
                 <a:tc>
                   <a:txBody>
                     <a:bodyPr/>
                     <a:lstStyle/>
                     <a:p>
-                      <a:endParaRPr lang="en-US"/>
+                      <a:pPr algn="l" fontAlgn="b"/>
+                      <a:r>
+                        <a:rPr lang="en-US" sz="2000" u="none" strike="noStrike" dirty="0">
+                          <a:effectLst/>
+                          <a:latin typeface="Arial" panose="020B0604020202020204" pitchFamily="34" charset="0"/>
+                          <a:cs typeface="Arial" panose="020B0604020202020204" pitchFamily="34" charset="0"/>
+                        </a:rPr>
+                        <a:t>RNA-binding </a:t>
+                      </a:r>
+                      <a:endParaRPr lang="en-US" sz="2000" b="0" i="0" u="none" strike="noStrike" dirty="0">
+                        <a:solidFill>
+                          <a:srgbClr val="000000"/>
+                        </a:solidFill>
+                        <a:effectLst/>
+                        <a:latin typeface="Arial" panose="020B0604020202020204" pitchFamily="34" charset="0"/>
+                        <a:cs typeface="Arial" panose="020B0604020202020204" pitchFamily="34" charset="0"/>
+                      </a:endParaRPr>
                     </a:p>
                   </a:txBody>
-                  <a:tcPr/>
+                  <a:tcPr marL="45720" marR="45720" anchor="b"/>
+                </a:tc>
+                <a:tc>
+                  <a:txBody>
+                    <a:bodyPr/>
+                    <a:lstStyle/>
+                    <a:p>
+                      <a:pPr algn="l" fontAlgn="b"/>
+                      <a:r>
+                        <a:rPr lang="en-US" sz="2000" u="none" strike="noStrike">
+                          <a:effectLst/>
+                          <a:latin typeface="Arial" panose="020B0604020202020204" pitchFamily="34" charset="0"/>
+                          <a:cs typeface="Arial" panose="020B0604020202020204" pitchFamily="34" charset="0"/>
+                        </a:rPr>
+                        <a:t>No</a:t>
+                      </a:r>
+                      <a:endParaRPr lang="en-US" sz="2000" b="0" i="0" u="none" strike="noStrike">
+                        <a:solidFill>
+                          <a:srgbClr val="000000"/>
+                        </a:solidFill>
+                        <a:effectLst/>
+                        <a:latin typeface="Arial" panose="020B0604020202020204" pitchFamily="34" charset="0"/>
+                        <a:cs typeface="Arial" panose="020B0604020202020204" pitchFamily="34" charset="0"/>
+                      </a:endParaRPr>
+                    </a:p>
+                  </a:txBody>
+                  <a:tcPr marL="45720" marR="45720" anchor="b"/>
                 </a:tc>
                 <a:extLst>
                   <a:ext uri="{0D108BD9-81ED-4DB2-BD59-A6C34878D82A}">
@@ -9196,30 +10995,104 @@
                     <a:bodyPr/>
                     <a:lstStyle/>
                     <a:p>
-                      <a:endParaRPr lang="en-US"/>
+                      <a:pPr algn="l" fontAlgn="b"/>
+                      <a:r>
+                        <a:rPr lang="en-US" sz="2000" u="none" strike="noStrike" dirty="0">
+                          <a:effectLst/>
+                          <a:latin typeface="Arial" panose="020B0604020202020204" pitchFamily="34" charset="0"/>
+                          <a:cs typeface="Arial" panose="020B0604020202020204" pitchFamily="34" charset="0"/>
+                        </a:rPr>
+                        <a:t>5317</a:t>
+                      </a:r>
+                      <a:endParaRPr lang="en-US" sz="2000" b="0" i="0" u="none" strike="noStrike" dirty="0">
+                        <a:solidFill>
+                          <a:srgbClr val="000000"/>
+                        </a:solidFill>
+                        <a:effectLst/>
+                        <a:latin typeface="Arial" panose="020B0604020202020204" pitchFamily="34" charset="0"/>
+                        <a:cs typeface="Arial" panose="020B0604020202020204" pitchFamily="34" charset="0"/>
+                      </a:endParaRPr>
                     </a:p>
                   </a:txBody>
-                  <a:tcPr/>
+                  <a:tcPr marL="45720" marR="45720" anchor="b"/>
                 </a:tc>
                 <a:tc>
                   <a:txBody>
                     <a:bodyPr/>
                     <a:lstStyle/>
                     <a:p>
-                      <a:endParaRPr lang="en-US"/>
+                      <a:pPr algn="l" fontAlgn="b"/>
+                      <a:r>
+                        <a:rPr lang="en-US" sz="2000" u="none" strike="noStrike">
+                          <a:effectLst/>
+                          <a:latin typeface="Arial" panose="020B0604020202020204" pitchFamily="34" charset="0"/>
+                          <a:cs typeface="Arial" panose="020B0604020202020204" pitchFamily="34" charset="0"/>
+                        </a:rPr>
+                        <a:t>PKP1</a:t>
+                      </a:r>
+                      <a:endParaRPr lang="en-US" sz="2000" b="0" i="0" u="none" strike="noStrike">
+                        <a:solidFill>
+                          <a:srgbClr val="000000"/>
+                        </a:solidFill>
+                        <a:effectLst/>
+                        <a:latin typeface="Arial" panose="020B0604020202020204" pitchFamily="34" charset="0"/>
+                        <a:cs typeface="Arial" panose="020B0604020202020204" pitchFamily="34" charset="0"/>
+                      </a:endParaRPr>
                     </a:p>
                   </a:txBody>
-                  <a:tcPr/>
+                  <a:tcPr marL="45720" marR="45720" anchor="b"/>
                 </a:tc>
                 <a:tc>
                   <a:txBody>
                     <a:bodyPr/>
                     <a:lstStyle/>
                     <a:p>
-                      <a:endParaRPr lang="en-US"/>
+                      <a:pPr algn="l" fontAlgn="b"/>
+                      <a:r>
+                        <a:rPr lang="en-US" sz="2000" u="none" strike="noStrike" dirty="0">
+                          <a:effectLst/>
+                          <a:latin typeface="Arial" panose="020B0604020202020204" pitchFamily="34" charset="0"/>
+                          <a:cs typeface="Arial" panose="020B0604020202020204" pitchFamily="34" charset="0"/>
+                        </a:rPr>
+                        <a:t>Cytoskeleton</a:t>
+                      </a:r>
+                      <a:endParaRPr lang="en-US" sz="2000" b="0" i="0" u="none" strike="noStrike" dirty="0">
+                        <a:solidFill>
+                          <a:srgbClr val="000000"/>
+                        </a:solidFill>
+                        <a:effectLst/>
+                        <a:latin typeface="Arial" panose="020B0604020202020204" pitchFamily="34" charset="0"/>
+                        <a:cs typeface="Arial" panose="020B0604020202020204" pitchFamily="34" charset="0"/>
+                      </a:endParaRPr>
                     </a:p>
                   </a:txBody>
-                  <a:tcPr/>
+                  <a:tcPr marL="45720" marR="45720" anchor="b"/>
+                </a:tc>
+                <a:tc>
+                  <a:txBody>
+                    <a:bodyPr/>
+                    <a:lstStyle/>
+                    <a:p>
+                      <a:pPr algn="l" fontAlgn="b"/>
+                      <a:r>
+                        <a:rPr lang="en-US" sz="2000" u="none" strike="noStrike">
+                          <a:effectLst/>
+                          <a:latin typeface="Arial" panose="020B0604020202020204" pitchFamily="34" charset="0"/>
+                          <a:cs typeface="Arial" panose="020B0604020202020204" pitchFamily="34" charset="0"/>
+                        </a:rPr>
+                        <a:t>Yes</a:t>
+                      </a:r>
+                      <a:endParaRPr lang="en-US" sz="2000" b="0" i="0" u="none" strike="noStrike">
+                        <a:solidFill>
+                          <a:srgbClr val="000000"/>
+                        </a:solidFill>
+                        <a:effectLst/>
+                        <a:latin typeface="Arial" panose="020B0604020202020204" pitchFamily="34" charset="0"/>
+                        <a:cs typeface="Arial" panose="020B0604020202020204" pitchFamily="34" charset="0"/>
+                      </a:endParaRPr>
+                    </a:p>
+                  </a:txBody>
+                  <a:tcPr marL="45720" marR="45720" anchor="b"/>
                 </a:tc>
                 <a:extLst>
                   <a:ext uri="{0D108BD9-81ED-4DB2-BD59-A6C34878D82A}">
@@ -9233,30 +11106,104 @@
                     <a:bodyPr/>
                     <a:lstStyle/>
                     <a:p>
-                      <a:endParaRPr lang="en-US"/>
+                      <a:pPr algn="l" fontAlgn="b"/>
+                      <a:r>
+                        <a:rPr lang="en-US" sz="2000" u="none" strike="noStrike" dirty="0">
+                          <a:effectLst/>
+                          <a:latin typeface="Arial" panose="020B0604020202020204" pitchFamily="34" charset="0"/>
+                          <a:cs typeface="Arial" panose="020B0604020202020204" pitchFamily="34" charset="0"/>
+                        </a:rPr>
+                        <a:t>3868</a:t>
+                      </a:r>
+                      <a:endParaRPr lang="en-US" sz="2000" b="0" i="0" u="none" strike="noStrike" dirty="0">
+                        <a:solidFill>
+                          <a:srgbClr val="000000"/>
+                        </a:solidFill>
+                        <a:effectLst/>
+                        <a:latin typeface="Arial" panose="020B0604020202020204" pitchFamily="34" charset="0"/>
+                        <a:cs typeface="Arial" panose="020B0604020202020204" pitchFamily="34" charset="0"/>
+                      </a:endParaRPr>
                     </a:p>
                   </a:txBody>
-                  <a:tcPr/>
+                  <a:tcPr marL="45720" marR="45720" anchor="b"/>
                 </a:tc>
                 <a:tc>
                   <a:txBody>
                     <a:bodyPr/>
                     <a:lstStyle/>
                     <a:p>
-                      <a:endParaRPr lang="en-US"/>
+                      <a:pPr algn="l" fontAlgn="b"/>
+                      <a:r>
+                        <a:rPr lang="en-US" sz="2000" u="none" strike="noStrike">
+                          <a:effectLst/>
+                          <a:latin typeface="Arial" panose="020B0604020202020204" pitchFamily="34" charset="0"/>
+                          <a:cs typeface="Arial" panose="020B0604020202020204" pitchFamily="34" charset="0"/>
+                        </a:rPr>
+                        <a:t>KRT16</a:t>
+                      </a:r>
+                      <a:endParaRPr lang="en-US" sz="2000" b="0" i="0" u="none" strike="noStrike">
+                        <a:solidFill>
+                          <a:srgbClr val="000000"/>
+                        </a:solidFill>
+                        <a:effectLst/>
+                        <a:latin typeface="Arial" panose="020B0604020202020204" pitchFamily="34" charset="0"/>
+                        <a:cs typeface="Arial" panose="020B0604020202020204" pitchFamily="34" charset="0"/>
+                      </a:endParaRPr>
                     </a:p>
                   </a:txBody>
-                  <a:tcPr/>
+                  <a:tcPr marL="45720" marR="45720" anchor="b"/>
                 </a:tc>
                 <a:tc>
                   <a:txBody>
                     <a:bodyPr/>
                     <a:lstStyle/>
                     <a:p>
-                      <a:endParaRPr lang="en-US"/>
+                      <a:pPr algn="l" fontAlgn="b"/>
+                      <a:r>
+                        <a:rPr lang="en-US" sz="2000" u="none" strike="noStrike" dirty="0">
+                          <a:effectLst/>
+                          <a:latin typeface="Arial" panose="020B0604020202020204" pitchFamily="34" charset="0"/>
+                          <a:cs typeface="Arial" panose="020B0604020202020204" pitchFamily="34" charset="0"/>
+                        </a:rPr>
+                        <a:t>Epithelial cell cytoskeleton</a:t>
+                      </a:r>
+                      <a:endParaRPr lang="en-US" sz="2000" b="0" i="0" u="none" strike="noStrike" dirty="0">
+                        <a:solidFill>
+                          <a:srgbClr val="000000"/>
+                        </a:solidFill>
+                        <a:effectLst/>
+                        <a:latin typeface="Arial" panose="020B0604020202020204" pitchFamily="34" charset="0"/>
+                        <a:cs typeface="Arial" panose="020B0604020202020204" pitchFamily="34" charset="0"/>
+                      </a:endParaRPr>
                     </a:p>
                   </a:txBody>
-                  <a:tcPr/>
+                  <a:tcPr marL="45720" marR="45720" anchor="b"/>
+                </a:tc>
+                <a:tc>
+                  <a:txBody>
+                    <a:bodyPr/>
+                    <a:lstStyle/>
+                    <a:p>
+                      <a:pPr algn="l" fontAlgn="b"/>
+                      <a:r>
+                        <a:rPr lang="en-US" sz="2000" u="none" strike="noStrike">
+                          <a:effectLst/>
+                          <a:latin typeface="Arial" panose="020B0604020202020204" pitchFamily="34" charset="0"/>
+                          <a:cs typeface="Arial" panose="020B0604020202020204" pitchFamily="34" charset="0"/>
+                        </a:rPr>
+                        <a:t>No</a:t>
+                      </a:r>
+                      <a:endParaRPr lang="en-US" sz="2000" b="0" i="0" u="none" strike="noStrike">
+                        <a:solidFill>
+                          <a:srgbClr val="000000"/>
+                        </a:solidFill>
+                        <a:effectLst/>
+                        <a:latin typeface="Arial" panose="020B0604020202020204" pitchFamily="34" charset="0"/>
+                        <a:cs typeface="Arial" panose="020B0604020202020204" pitchFamily="34" charset="0"/>
+                      </a:endParaRPr>
+                    </a:p>
+                  </a:txBody>
+                  <a:tcPr marL="45720" marR="45720" anchor="b"/>
                 </a:tc>
                 <a:extLst>
                   <a:ext uri="{0D108BD9-81ED-4DB2-BD59-A6C34878D82A}">
@@ -9270,30 +11217,104 @@
                     <a:bodyPr/>
                     <a:lstStyle/>
                     <a:p>
-                      <a:endParaRPr lang="en-US"/>
+                      <a:pPr algn="l" fontAlgn="b"/>
+                      <a:r>
+                        <a:rPr lang="en-US" sz="2000" u="none" strike="noStrike" dirty="0">
+                          <a:effectLst/>
+                          <a:latin typeface="Arial" panose="020B0604020202020204" pitchFamily="34" charset="0"/>
+                          <a:cs typeface="Arial" panose="020B0604020202020204" pitchFamily="34" charset="0"/>
+                        </a:rPr>
+                        <a:t>9168</a:t>
+                      </a:r>
+                      <a:endParaRPr lang="en-US" sz="2000" b="0" i="0" u="none" strike="noStrike" dirty="0">
+                        <a:solidFill>
+                          <a:srgbClr val="000000"/>
+                        </a:solidFill>
+                        <a:effectLst/>
+                        <a:latin typeface="Arial" panose="020B0604020202020204" pitchFamily="34" charset="0"/>
+                        <a:cs typeface="Arial" panose="020B0604020202020204" pitchFamily="34" charset="0"/>
+                      </a:endParaRPr>
                     </a:p>
                   </a:txBody>
-                  <a:tcPr/>
+                  <a:tcPr marL="45720" marR="45720" anchor="b"/>
                 </a:tc>
                 <a:tc>
                   <a:txBody>
                     <a:bodyPr/>
                     <a:lstStyle/>
                     <a:p>
-                      <a:endParaRPr lang="en-US"/>
+                      <a:pPr algn="l" fontAlgn="b"/>
+                      <a:r>
+                        <a:rPr lang="en-US" sz="2000" u="none" strike="noStrike">
+                          <a:effectLst/>
+                          <a:latin typeface="Arial" panose="020B0604020202020204" pitchFamily="34" charset="0"/>
+                          <a:cs typeface="Arial" panose="020B0604020202020204" pitchFamily="34" charset="0"/>
+                        </a:rPr>
+                        <a:t>TMSB10</a:t>
+                      </a:r>
+                      <a:endParaRPr lang="en-US" sz="2000" b="0" i="0" u="none" strike="noStrike">
+                        <a:solidFill>
+                          <a:srgbClr val="000000"/>
+                        </a:solidFill>
+                        <a:effectLst/>
+                        <a:latin typeface="Arial" panose="020B0604020202020204" pitchFamily="34" charset="0"/>
+                        <a:cs typeface="Arial" panose="020B0604020202020204" pitchFamily="34" charset="0"/>
+                      </a:endParaRPr>
                     </a:p>
                   </a:txBody>
-                  <a:tcPr/>
+                  <a:tcPr marL="45720" marR="45720" anchor="b"/>
                 </a:tc>
                 <a:tc>
                   <a:txBody>
                     <a:bodyPr/>
                     <a:lstStyle/>
                     <a:p>
-                      <a:endParaRPr lang="en-US"/>
+                      <a:pPr algn="l" fontAlgn="b"/>
+                      <a:r>
+                        <a:rPr lang="en-US" sz="2000" u="none" strike="noStrike" dirty="0">
+                          <a:effectLst/>
+                          <a:latin typeface="Arial" panose="020B0604020202020204" pitchFamily="34" charset="0"/>
+                          <a:cs typeface="Arial" panose="020B0604020202020204" pitchFamily="34" charset="0"/>
+                        </a:rPr>
+                        <a:t>Actin binding</a:t>
+                      </a:r>
+                      <a:endParaRPr lang="en-US" sz="2000" b="0" i="0" u="none" strike="noStrike" dirty="0">
+                        <a:solidFill>
+                          <a:srgbClr val="000000"/>
+                        </a:solidFill>
+                        <a:effectLst/>
+                        <a:latin typeface="Arial" panose="020B0604020202020204" pitchFamily="34" charset="0"/>
+                        <a:cs typeface="Arial" panose="020B0604020202020204" pitchFamily="34" charset="0"/>
+                      </a:endParaRPr>
                     </a:p>
                   </a:txBody>
-                  <a:tcPr/>
+                  <a:tcPr marL="45720" marR="45720" anchor="b"/>
+                </a:tc>
+                <a:tc>
+                  <a:txBody>
+                    <a:bodyPr/>
+                    <a:lstStyle/>
+                    <a:p>
+                      <a:pPr algn="l" fontAlgn="b"/>
+                      <a:r>
+                        <a:rPr lang="en-US" sz="2000" u="none" strike="noStrike" dirty="0">
+                          <a:effectLst/>
+                          <a:latin typeface="Arial" panose="020B0604020202020204" pitchFamily="34" charset="0"/>
+                          <a:cs typeface="Arial" panose="020B0604020202020204" pitchFamily="34" charset="0"/>
+                        </a:rPr>
+                        <a:t>Yes</a:t>
+                      </a:r>
+                      <a:endParaRPr lang="en-US" sz="2000" b="0" i="0" u="none" strike="noStrike" dirty="0">
+                        <a:solidFill>
+                          <a:srgbClr val="000000"/>
+                        </a:solidFill>
+                        <a:effectLst/>
+                        <a:latin typeface="Arial" panose="020B0604020202020204" pitchFamily="34" charset="0"/>
+                        <a:cs typeface="Arial" panose="020B0604020202020204" pitchFamily="34" charset="0"/>
+                      </a:endParaRPr>
+                    </a:p>
+                  </a:txBody>
+                  <a:tcPr marL="45720" marR="45720" anchor="b"/>
                 </a:tc>
                 <a:extLst>
                   <a:ext uri="{0D108BD9-81ED-4DB2-BD59-A6C34878D82A}">
@@ -9307,30 +11328,104 @@
                     <a:bodyPr/>
                     <a:lstStyle/>
                     <a:p>
-                      <a:endParaRPr lang="en-US"/>
+                      <a:pPr algn="l" fontAlgn="b"/>
+                      <a:r>
+                        <a:rPr lang="en-US" sz="2000" u="none" strike="noStrike" dirty="0">
+                          <a:effectLst/>
+                          <a:latin typeface="Arial" panose="020B0604020202020204" pitchFamily="34" charset="0"/>
+                          <a:cs typeface="Arial" panose="020B0604020202020204" pitchFamily="34" charset="0"/>
+                        </a:rPr>
+                        <a:t>6273</a:t>
+                      </a:r>
+                      <a:endParaRPr lang="en-US" sz="2000" b="0" i="0" u="none" strike="noStrike" dirty="0">
+                        <a:solidFill>
+                          <a:srgbClr val="000000"/>
+                        </a:solidFill>
+                        <a:effectLst/>
+                        <a:latin typeface="Arial" panose="020B0604020202020204" pitchFamily="34" charset="0"/>
+                        <a:cs typeface="Arial" panose="020B0604020202020204" pitchFamily="34" charset="0"/>
+                      </a:endParaRPr>
                     </a:p>
                   </a:txBody>
-                  <a:tcPr/>
+                  <a:tcPr marL="45720" marR="45720" anchor="b"/>
                 </a:tc>
                 <a:tc>
                   <a:txBody>
                     <a:bodyPr/>
                     <a:lstStyle/>
                     <a:p>
-                      <a:endParaRPr lang="en-US"/>
+                      <a:pPr algn="l" fontAlgn="b"/>
+                      <a:r>
+                        <a:rPr lang="en-US" sz="2000" u="none" strike="noStrike">
+                          <a:effectLst/>
+                          <a:latin typeface="Arial" panose="020B0604020202020204" pitchFamily="34" charset="0"/>
+                          <a:cs typeface="Arial" panose="020B0604020202020204" pitchFamily="34" charset="0"/>
+                        </a:rPr>
+                        <a:t>S100A2</a:t>
+                      </a:r>
+                      <a:endParaRPr lang="en-US" sz="2000" b="0" i="0" u="none" strike="noStrike">
+                        <a:solidFill>
+                          <a:srgbClr val="000000"/>
+                        </a:solidFill>
+                        <a:effectLst/>
+                        <a:latin typeface="Arial" panose="020B0604020202020204" pitchFamily="34" charset="0"/>
+                        <a:cs typeface="Arial" panose="020B0604020202020204" pitchFamily="34" charset="0"/>
+                      </a:endParaRPr>
                     </a:p>
                   </a:txBody>
-                  <a:tcPr/>
+                  <a:tcPr marL="45720" marR="45720" anchor="b"/>
                 </a:tc>
                 <a:tc>
                   <a:txBody>
                     <a:bodyPr/>
                     <a:lstStyle/>
                     <a:p>
-                      <a:endParaRPr lang="en-US" dirty="0"/>
+                      <a:pPr algn="l" fontAlgn="b"/>
+                      <a:r>
+                        <a:rPr lang="en-US" sz="2000" u="none" strike="noStrike">
+                          <a:effectLst/>
+                          <a:latin typeface="Arial" panose="020B0604020202020204" pitchFamily="34" charset="0"/>
+                          <a:cs typeface="Arial" panose="020B0604020202020204" pitchFamily="34" charset="0"/>
+                        </a:rPr>
+                        <a:t>Cell cycle regulation</a:t>
+                      </a:r>
+                      <a:endParaRPr lang="en-US" sz="2000" b="0" i="0" u="none" strike="noStrike">
+                        <a:solidFill>
+                          <a:srgbClr val="000000"/>
+                        </a:solidFill>
+                        <a:effectLst/>
+                        <a:latin typeface="Arial" panose="020B0604020202020204" pitchFamily="34" charset="0"/>
+                        <a:cs typeface="Arial" panose="020B0604020202020204" pitchFamily="34" charset="0"/>
+                      </a:endParaRPr>
                     </a:p>
                   </a:txBody>
-                  <a:tcPr/>
+                  <a:tcPr marL="45720" marR="45720" anchor="b"/>
+                </a:tc>
+                <a:tc>
+                  <a:txBody>
+                    <a:bodyPr/>
+                    <a:lstStyle/>
+                    <a:p>
+                      <a:pPr algn="l" fontAlgn="b"/>
+                      <a:r>
+                        <a:rPr lang="en-US" sz="2000" u="none" strike="noStrike" dirty="0">
+                          <a:effectLst/>
+                          <a:latin typeface="Arial" panose="020B0604020202020204" pitchFamily="34" charset="0"/>
+                          <a:cs typeface="Arial" panose="020B0604020202020204" pitchFamily="34" charset="0"/>
+                        </a:rPr>
+                        <a:t>Yes</a:t>
+                      </a:r>
+                      <a:endParaRPr lang="en-US" sz="2000" b="0" i="0" u="none" strike="noStrike" dirty="0">
+                        <a:solidFill>
+                          <a:srgbClr val="000000"/>
+                        </a:solidFill>
+                        <a:effectLst/>
+                        <a:latin typeface="Arial" panose="020B0604020202020204" pitchFamily="34" charset="0"/>
+                        <a:cs typeface="Arial" panose="020B0604020202020204" pitchFamily="34" charset="0"/>
+                      </a:endParaRPr>
+                    </a:p>
+                  </a:txBody>
+                  <a:tcPr marL="45720" marR="45720" anchor="b"/>
                 </a:tc>
                 <a:extLst>
                   <a:ext uri="{0D108BD9-81ED-4DB2-BD59-A6C34878D82A}">
@@ -9342,6 +11437,64 @@
           </a:graphicData>
         </a:graphic>
       </p:graphicFrame>
+      <p:sp>
+        <p:nvSpPr>
+          <p:cNvPr id="3" name="Title 1">
+            <a:extLst>
+              <a:ext uri="{FF2B5EF4-FFF2-40B4-BE49-F238E27FC236}">
+                <a16:creationId xmlns:a16="http://schemas.microsoft.com/office/drawing/2014/main" id="{E13913D9-7DF0-480E-B923-96481E51F4C7}"/>
+              </a:ext>
+            </a:extLst>
+          </p:cNvPr>
+          <p:cNvSpPr txBox="1">
+            <a:spLocks/>
+          </p:cNvSpPr>
+          <p:nvPr/>
+        </p:nvSpPr>
+        <p:spPr>
+          <a:xfrm>
+            <a:off x="681038" y="365128"/>
+            <a:ext cx="8543925" cy="1038712"/>
+          </a:xfrm>
+          <a:prstGeom prst="rect">
+            <a:avLst/>
+          </a:prstGeom>
+        </p:spPr>
+        <p:txBody>
+          <a:bodyPr>
+            <a:normAutofit/>
+          </a:bodyPr>
+          <a:lstStyle>
+            <a:lvl1pPr algn="l" defTabSz="914400" rtl="0" eaLnBrk="1" latinLnBrk="0" hangingPunct="1">
+              <a:lnSpc>
+                <a:spcPct val="90000"/>
+              </a:lnSpc>
+              <a:spcBef>
+                <a:spcPct val="0"/>
+              </a:spcBef>
+              <a:buNone/>
+              <a:defRPr sz="4400" kern="1200">
+                <a:solidFill>
+                  <a:schemeClr val="tx1"/>
+                </a:solidFill>
+                <a:latin typeface="+mj-lt"/>
+                <a:ea typeface="+mj-ea"/>
+                <a:cs typeface="+mj-cs"/>
+              </a:defRPr>
+            </a:lvl1pPr>
+          </a:lstStyle>
+          <a:p>
+            <a:pPr algn="ctr"/>
+            <a:r>
+              <a:rPr lang="en-US" sz="3600" dirty="0">
+                <a:latin typeface="Arial" panose="020B0604020202020204" pitchFamily="34" charset="0"/>
+                <a:cs typeface="Arial" panose="020B0604020202020204" pitchFamily="34" charset="0"/>
+              </a:rPr>
+              <a:t>High Scoring Genes</a:t>
+            </a:r>
+          </a:p>
+        </p:txBody>
+      </p:sp>
     </p:spTree>
     <p:extLst>
       <p:ext uri="{BB962C8B-B14F-4D97-AF65-F5344CB8AC3E}">
@@ -9355,7 +11508,7 @@
 </p:sld>
 </file>
 
-<file path=ppt/slides/slide14.xml><?xml version="1.0" encoding="utf-8"?>
+<file path=ppt/slides/slide17.xml><?xml version="1.0" encoding="utf-8"?>
 <p:sld xmlns:a="http://schemas.openxmlformats.org/drawingml/2006/main" xmlns:r="http://schemas.openxmlformats.org/officeDocument/2006/relationships" xmlns:p="http://schemas.openxmlformats.org/presentationml/2006/main">
   <p:cSld>
     <p:spTree>
@@ -9449,6 +11602,100 @@
 </file>
 
 <file path=ppt/slides/slide2.xml><?xml version="1.0" encoding="utf-8"?>
+<p:sld xmlns:a="http://schemas.openxmlformats.org/drawingml/2006/main" xmlns:r="http://schemas.openxmlformats.org/officeDocument/2006/relationships" xmlns:p="http://schemas.openxmlformats.org/presentationml/2006/main">
+  <p:cSld>
+    <p:spTree>
+      <p:nvGrpSpPr>
+        <p:cNvPr id="1" name=""/>
+        <p:cNvGrpSpPr/>
+        <p:nvPr/>
+      </p:nvGrpSpPr>
+      <p:grpSpPr>
+        <a:xfrm>
+          <a:off x="0" y="0"/>
+          <a:ext cx="0" cy="0"/>
+          <a:chOff x="0" y="0"/>
+          <a:chExt cx="0" cy="0"/>
+        </a:xfrm>
+      </p:grpSpPr>
+      <p:sp>
+        <p:nvSpPr>
+          <p:cNvPr id="2" name="Title 1">
+            <a:extLst>
+              <a:ext uri="{FF2B5EF4-FFF2-40B4-BE49-F238E27FC236}">
+                <a16:creationId xmlns:a16="http://schemas.microsoft.com/office/drawing/2014/main" id="{90FBA9F3-1B77-4A3A-BFDA-A01273589195}"/>
+              </a:ext>
+            </a:extLst>
+          </p:cNvPr>
+          <p:cNvSpPr>
+            <a:spLocks noGrp="1"/>
+          </p:cNvSpPr>
+          <p:nvPr>
+            <p:ph type="title"/>
+          </p:nvPr>
+        </p:nvSpPr>
+        <p:spPr/>
+        <p:txBody>
+          <a:bodyPr>
+            <a:normAutofit/>
+          </a:bodyPr>
+          <a:lstStyle/>
+          <a:p>
+            <a:r>
+              <a:rPr lang="en-US" sz="4000" dirty="0">
+                <a:latin typeface="Arial" panose="020B0604020202020204" pitchFamily="34" charset="0"/>
+                <a:cs typeface="Arial" panose="020B0604020202020204" pitchFamily="34" charset="0"/>
+              </a:rPr>
+              <a:t>Network Based Co-Expression Patterns</a:t>
+            </a:r>
+          </a:p>
+        </p:txBody>
+      </p:sp>
+      <p:sp>
+        <p:nvSpPr>
+          <p:cNvPr id="3" name="Text Placeholder 2">
+            <a:extLst>
+              <a:ext uri="{FF2B5EF4-FFF2-40B4-BE49-F238E27FC236}">
+                <a16:creationId xmlns:a16="http://schemas.microsoft.com/office/drawing/2014/main" id="{01EAB58A-2CC8-45C1-9A01-3064561BD840}"/>
+              </a:ext>
+            </a:extLst>
+          </p:cNvPr>
+          <p:cNvSpPr>
+            <a:spLocks noGrp="1"/>
+          </p:cNvSpPr>
+          <p:nvPr>
+            <p:ph type="body" idx="1"/>
+          </p:nvPr>
+        </p:nvSpPr>
+        <p:spPr/>
+        <p:txBody>
+          <a:bodyPr/>
+          <a:lstStyle/>
+          <a:p>
+            <a:r>
+              <a:rPr lang="en-US" dirty="0">
+                <a:latin typeface="Arial" panose="020B0604020202020204" pitchFamily="34" charset="0"/>
+                <a:cs typeface="Arial" panose="020B0604020202020204" pitchFamily="34" charset="0"/>
+              </a:rPr>
+              <a:t>A tool for integrating time-course expression data into differential expression analysis</a:t>
+            </a:r>
+          </a:p>
+        </p:txBody>
+      </p:sp>
+    </p:spTree>
+    <p:extLst>
+      <p:ext uri="{BB962C8B-B14F-4D97-AF65-F5344CB8AC3E}">
+        <p14:creationId xmlns:p14="http://schemas.microsoft.com/office/powerpoint/2010/main" val="921489834"/>
+      </p:ext>
+    </p:extLst>
+  </p:cSld>
+  <p:clrMapOvr>
+    <a:masterClrMapping/>
+  </p:clrMapOvr>
+</p:sld>
+</file>
+
+<file path=ppt/slides/slide3.xml><?xml version="1.0" encoding="utf-8"?>
 <p:sld xmlns:a="http://schemas.openxmlformats.org/drawingml/2006/main" xmlns:r="http://schemas.openxmlformats.org/officeDocument/2006/relationships" xmlns:p="http://schemas.openxmlformats.org/presentationml/2006/main">
   <p:cSld>
     <p:spTree>
@@ -9596,7 +11843,7 @@
 </p:sld>
 </file>
 
-<file path=ppt/slides/slide3.xml><?xml version="1.0" encoding="utf-8"?>
+<file path=ppt/slides/slide4.xml><?xml version="1.0" encoding="utf-8"?>
 <p:sld xmlns:a="http://schemas.openxmlformats.org/drawingml/2006/main" xmlns:r="http://schemas.openxmlformats.org/officeDocument/2006/relationships" xmlns:p="http://schemas.openxmlformats.org/presentationml/2006/main">
   <p:cSld>
     <p:spTree>
@@ -9839,7 +12086,7 @@
 </p:sld>
 </file>
 
-<file path=ppt/slides/slide4.xml><?xml version="1.0" encoding="utf-8"?>
+<file path=ppt/slides/slide5.xml><?xml version="1.0" encoding="utf-8"?>
 <p:sld xmlns:a="http://schemas.openxmlformats.org/drawingml/2006/main" xmlns:r="http://schemas.openxmlformats.org/officeDocument/2006/relationships" xmlns:p="http://schemas.openxmlformats.org/presentationml/2006/main">
   <p:cSld>
     <p:spTree>
@@ -9933,8 +12180,8 @@
           </a:extLst>
         </p:spPr>
       </p:pic>
-      <mc:AlternateContent xmlns:mc="http://schemas.openxmlformats.org/markup-compatibility/2006">
-        <mc:Choice xmlns:a14="http://schemas.microsoft.com/office/drawing/2010/main" Requires="a14">
+      <mc:AlternateContent xmlns:mc="http://schemas.openxmlformats.org/markup-compatibility/2006" xmlns:a14="http://schemas.microsoft.com/office/drawing/2010/main">
+        <mc:Choice Requires="a14">
           <p:sp>
             <p:nvSpPr>
               <p:cNvPr id="6" name="TextBox 5">
@@ -10517,7 +12764,7 @@
             </p:txBody>
           </p:sp>
         </mc:Choice>
-        <mc:Fallback>
+        <mc:Fallback xmlns="">
           <p:sp>
             <p:nvSpPr>
               <p:cNvPr id="6" name="TextBox 5">
@@ -10627,7 +12874,7 @@
 </p:sld>
 </file>
 
-<file path=ppt/slides/slide5.xml><?xml version="1.0" encoding="utf-8"?>
+<file path=ppt/slides/slide6.xml><?xml version="1.0" encoding="utf-8"?>
 <p:sld xmlns:a="http://schemas.openxmlformats.org/drawingml/2006/main" xmlns:r="http://schemas.openxmlformats.org/officeDocument/2006/relationships" xmlns:p="http://schemas.openxmlformats.org/presentationml/2006/main">
   <p:cSld>
     <p:spTree>
@@ -10829,7 +13076,7 @@
 </p:sld>
 </file>
 
-<file path=ppt/slides/slide6.xml><?xml version="1.0" encoding="utf-8"?>
+<file path=ppt/slides/slide7.xml><?xml version="1.0" encoding="utf-8"?>
 <p:sld xmlns:a="http://schemas.openxmlformats.org/drawingml/2006/main" xmlns:r="http://schemas.openxmlformats.org/officeDocument/2006/relationships" xmlns:p="http://schemas.openxmlformats.org/presentationml/2006/main">
   <p:cSld>
     <p:spTree>
@@ -11054,7 +13301,7 @@
 </p:sld>
 </file>
 
-<file path=ppt/slides/slide7.xml><?xml version="1.0" encoding="utf-8"?>
+<file path=ppt/slides/slide8.xml><?xml version="1.0" encoding="utf-8"?>
 <p:sld xmlns:a="http://schemas.openxmlformats.org/drawingml/2006/main" xmlns:r="http://schemas.openxmlformats.org/officeDocument/2006/relationships" xmlns:p="http://schemas.openxmlformats.org/presentationml/2006/main">
   <p:cSld>
     <p:spTree>
@@ -11249,7 +13496,7 @@
 </p:sld>
 </file>
 
-<file path=ppt/slides/slide8.xml><?xml version="1.0" encoding="utf-8"?>
+<file path=ppt/slides/slide9.xml><?xml version="1.0" encoding="utf-8"?>
 <p:sld xmlns:a="http://schemas.openxmlformats.org/drawingml/2006/main" xmlns:r="http://schemas.openxmlformats.org/officeDocument/2006/relationships" xmlns:p="http://schemas.openxmlformats.org/presentationml/2006/main">
   <p:cSld>
     <p:spTree>
@@ -11334,647 +13581,6 @@
     <p:extLst>
       <p:ext uri="{BB962C8B-B14F-4D97-AF65-F5344CB8AC3E}">
         <p14:creationId xmlns:p14="http://schemas.microsoft.com/office/powerpoint/2010/main" val="2538295737"/>
-      </p:ext>
-    </p:extLst>
-  </p:cSld>
-  <p:clrMapOvr>
-    <a:masterClrMapping/>
-  </p:clrMapOvr>
-</p:sld>
-</file>
-
-<file path=ppt/slides/slide9.xml><?xml version="1.0" encoding="utf-8"?>
-<p:sld xmlns:a="http://schemas.openxmlformats.org/drawingml/2006/main" xmlns:r="http://schemas.openxmlformats.org/officeDocument/2006/relationships" xmlns:p="http://schemas.openxmlformats.org/presentationml/2006/main">
-  <p:cSld>
-    <p:spTree>
-      <p:nvGrpSpPr>
-        <p:cNvPr id="1" name=""/>
-        <p:cNvGrpSpPr/>
-        <p:nvPr/>
-      </p:nvGrpSpPr>
-      <p:grpSpPr>
-        <a:xfrm>
-          <a:off x="0" y="0"/>
-          <a:ext cx="0" cy="0"/>
-          <a:chOff x="0" y="0"/>
-          <a:chExt cx="0" cy="0"/>
-        </a:xfrm>
-      </p:grpSpPr>
-      <p:pic>
-        <p:nvPicPr>
-          <p:cNvPr id="3" name="Picture 2">
-            <a:extLst>
-              <a:ext uri="{FF2B5EF4-FFF2-40B4-BE49-F238E27FC236}">
-                <a16:creationId xmlns:a16="http://schemas.microsoft.com/office/drawing/2014/main" id="{03FCD9DB-064E-48FD-8E83-5B344C241182}"/>
-              </a:ext>
-            </a:extLst>
-          </p:cNvPr>
-          <p:cNvPicPr>
-            <a:picLocks noChangeAspect="1"/>
-          </p:cNvPicPr>
-          <p:nvPr/>
-        </p:nvPicPr>
-        <p:blipFill rotWithShape="1">
-          <a:blip r:embed="rId2"/>
-          <a:srcRect t="35455" b="25260"/>
-          <a:stretch/>
-        </p:blipFill>
-        <p:spPr>
-          <a:xfrm>
-            <a:off x="5536180" y="131618"/>
-            <a:ext cx="4369820" cy="965638"/>
-          </a:xfrm>
-          <a:prstGeom prst="rect">
-            <a:avLst/>
-          </a:prstGeom>
-        </p:spPr>
-      </p:pic>
-      <p:graphicFrame>
-        <p:nvGraphicFramePr>
-          <p:cNvPr id="4" name="Diagram 3">
-            <a:extLst>
-              <a:ext uri="{FF2B5EF4-FFF2-40B4-BE49-F238E27FC236}">
-                <a16:creationId xmlns:a16="http://schemas.microsoft.com/office/drawing/2014/main" id="{9589D5A1-E963-4A7A-BAA6-6BAF9567C770}"/>
-              </a:ext>
-            </a:extLst>
-          </p:cNvPr>
-          <p:cNvGraphicFramePr/>
-          <p:nvPr>
-            <p:extLst>
-              <p:ext uri="{D42A27DB-BD31-4B8C-83A1-F6EECF244321}">
-                <p14:modId xmlns:p14="http://schemas.microsoft.com/office/powerpoint/2010/main" val="159866474"/>
-              </p:ext>
-            </p:extLst>
-          </p:nvPr>
-        </p:nvGraphicFramePr>
-        <p:xfrm>
-          <a:off x="0" y="131618"/>
-          <a:ext cx="3388833" cy="6594764"/>
-        </p:xfrm>
-        <a:graphic>
-          <a:graphicData uri="http://schemas.openxmlformats.org/drawingml/2006/diagram">
-            <dgm:relIds xmlns:dgm="http://schemas.openxmlformats.org/drawingml/2006/diagram" xmlns:r="http://schemas.openxmlformats.org/officeDocument/2006/relationships" r:dm="rId3" r:lo="rId4" r:qs="rId5" r:cs="rId6"/>
-          </a:graphicData>
-        </a:graphic>
-      </p:graphicFrame>
-      <p:pic>
-        <p:nvPicPr>
-          <p:cNvPr id="6" name="Picture 5">
-            <a:extLst>
-              <a:ext uri="{FF2B5EF4-FFF2-40B4-BE49-F238E27FC236}">
-                <a16:creationId xmlns:a16="http://schemas.microsoft.com/office/drawing/2014/main" id="{1F4B4065-F0DE-42BB-A061-FFB96521170B}"/>
-              </a:ext>
-            </a:extLst>
-          </p:cNvPr>
-          <p:cNvPicPr>
-            <a:picLocks noChangeAspect="1"/>
-          </p:cNvPicPr>
-          <p:nvPr/>
-        </p:nvPicPr>
-        <p:blipFill>
-          <a:blip r:embed="rId8">
-            <a:extLst>
-              <a:ext uri="{28A0092B-C50C-407E-A947-70E740481C1C}">
-                <a14:useLocalDpi xmlns:a14="http://schemas.microsoft.com/office/drawing/2010/main" val="0"/>
-              </a:ext>
-            </a:extLst>
-          </a:blip>
-          <a:stretch>
-            <a:fillRect/>
-          </a:stretch>
-        </p:blipFill>
-        <p:spPr>
-          <a:xfrm>
-            <a:off x="3767181" y="295349"/>
-            <a:ext cx="1390650" cy="638175"/>
-          </a:xfrm>
-          <a:prstGeom prst="rect">
-            <a:avLst/>
-          </a:prstGeom>
-        </p:spPr>
-      </p:pic>
-      <p:cxnSp>
-        <p:nvCxnSpPr>
-          <p:cNvPr id="8" name="Straight Arrow Connector 7">
-            <a:extLst>
-              <a:ext uri="{FF2B5EF4-FFF2-40B4-BE49-F238E27FC236}">
-                <a16:creationId xmlns:a16="http://schemas.microsoft.com/office/drawing/2014/main" id="{8861BEDA-E57D-4DF3-A960-C77FD158418B}"/>
-              </a:ext>
-            </a:extLst>
-          </p:cNvPr>
-          <p:cNvCxnSpPr>
-            <a:cxnSpLocks/>
-            <a:endCxn id="6" idx="1"/>
-          </p:cNvCxnSpPr>
-          <p:nvPr/>
-        </p:nvCxnSpPr>
-        <p:spPr>
-          <a:xfrm>
-            <a:off x="2708564" y="614437"/>
-            <a:ext cx="1058617" cy="0"/>
-          </a:xfrm>
-          <a:prstGeom prst="straightConnector1">
-            <a:avLst/>
-          </a:prstGeom>
-          <a:ln w="38100">
-            <a:solidFill>
-              <a:srgbClr val="E96F1B"/>
-            </a:solidFill>
-            <a:tailEnd type="triangle"/>
-          </a:ln>
-          <a:effectLst>
-            <a:outerShdw blurRad="50800" dist="38100" dir="2700000" algn="tl" rotWithShape="0">
-              <a:prstClr val="black">
-                <a:alpha val="40000"/>
-              </a:prstClr>
-            </a:outerShdw>
-          </a:effectLst>
-        </p:spPr>
-        <p:style>
-          <a:lnRef idx="1">
-            <a:schemeClr val="accent1"/>
-          </a:lnRef>
-          <a:fillRef idx="0">
-            <a:schemeClr val="accent1"/>
-          </a:fillRef>
-          <a:effectRef idx="0">
-            <a:schemeClr val="accent1"/>
-          </a:effectRef>
-          <a:fontRef idx="minor">
-            <a:schemeClr val="tx1"/>
-          </a:fontRef>
-        </p:style>
-      </p:cxnSp>
-      <p:cxnSp>
-        <p:nvCxnSpPr>
-          <p:cNvPr id="10" name="Straight Arrow Connector 9">
-            <a:extLst>
-              <a:ext uri="{FF2B5EF4-FFF2-40B4-BE49-F238E27FC236}">
-                <a16:creationId xmlns:a16="http://schemas.microsoft.com/office/drawing/2014/main" id="{3D1EB926-FE09-4BE3-8C81-FA16BC0C15BE}"/>
-              </a:ext>
-            </a:extLst>
-          </p:cNvPr>
-          <p:cNvCxnSpPr>
-            <a:cxnSpLocks/>
-            <a:stCxn id="6" idx="3"/>
-          </p:cNvCxnSpPr>
-          <p:nvPr/>
-        </p:nvCxnSpPr>
-        <p:spPr>
-          <a:xfrm flipV="1">
-            <a:off x="5157831" y="614436"/>
-            <a:ext cx="834260" cy="1"/>
-          </a:xfrm>
-          <a:prstGeom prst="straightConnector1">
-            <a:avLst/>
-          </a:prstGeom>
-          <a:ln w="38100">
-            <a:solidFill>
-              <a:srgbClr val="E96F1B"/>
-            </a:solidFill>
-            <a:tailEnd type="triangle"/>
-          </a:ln>
-          <a:effectLst>
-            <a:outerShdw blurRad="50800" dist="38100" dir="2700000" algn="tl" rotWithShape="0">
-              <a:prstClr val="black">
-                <a:alpha val="40000"/>
-              </a:prstClr>
-            </a:outerShdw>
-          </a:effectLst>
-        </p:spPr>
-        <p:style>
-          <a:lnRef idx="1">
-            <a:schemeClr val="accent1"/>
-          </a:lnRef>
-          <a:fillRef idx="0">
-            <a:schemeClr val="accent1"/>
-          </a:fillRef>
-          <a:effectRef idx="0">
-            <a:schemeClr val="accent1"/>
-          </a:effectRef>
-          <a:fontRef idx="minor">
-            <a:schemeClr val="tx1"/>
-          </a:fontRef>
-        </p:style>
-      </p:cxnSp>
-      <p:sp>
-        <p:nvSpPr>
-          <p:cNvPr id="14" name="TextBox 13">
-            <a:extLst>
-              <a:ext uri="{FF2B5EF4-FFF2-40B4-BE49-F238E27FC236}">
-                <a16:creationId xmlns:a16="http://schemas.microsoft.com/office/drawing/2014/main" id="{6316DA6A-0375-48D1-BD44-7B1039DC48CD}"/>
-              </a:ext>
-            </a:extLst>
-          </p:cNvPr>
-          <p:cNvSpPr txBox="1"/>
-          <p:nvPr/>
-        </p:nvSpPr>
-        <p:spPr>
-          <a:xfrm>
-            <a:off x="4237916" y="1640613"/>
-            <a:ext cx="4558506" cy="400110"/>
-          </a:xfrm>
-          <a:prstGeom prst="rect">
-            <a:avLst/>
-          </a:prstGeom>
-        </p:spPr>
-        <p:style>
-          <a:lnRef idx="0">
-            <a:schemeClr val="accent3"/>
-          </a:lnRef>
-          <a:fillRef idx="3">
-            <a:schemeClr val="accent3"/>
-          </a:fillRef>
-          <a:effectRef idx="3">
-            <a:schemeClr val="accent3"/>
-          </a:effectRef>
-          <a:fontRef idx="minor">
-            <a:schemeClr val="lt1"/>
-          </a:fontRef>
-        </p:style>
-        <p:txBody>
-          <a:bodyPr wrap="square" rtlCol="0">
-            <a:spAutoFit/>
-          </a:bodyPr>
-          <a:lstStyle/>
-          <a:p>
-            <a:pPr algn="ctr"/>
-            <a:r>
-              <a:rPr lang="en-US" sz="2000" dirty="0">
-                <a:latin typeface="Arial" panose="020B0604020202020204" pitchFamily="34" charset="0"/>
-                <a:cs typeface="Arial" panose="020B0604020202020204" pitchFamily="34" charset="0"/>
-              </a:rPr>
-              <a:t>Principal Components Analysis</a:t>
-            </a:r>
-          </a:p>
-        </p:txBody>
-      </p:sp>
-      <p:sp>
-        <p:nvSpPr>
-          <p:cNvPr id="16" name="TextBox 15">
-            <a:extLst>
-              <a:ext uri="{FF2B5EF4-FFF2-40B4-BE49-F238E27FC236}">
-                <a16:creationId xmlns:a16="http://schemas.microsoft.com/office/drawing/2014/main" id="{851706C7-36AA-4279-976B-86FAD8B3401D}"/>
-              </a:ext>
-            </a:extLst>
-          </p:cNvPr>
-          <p:cNvSpPr txBox="1"/>
-          <p:nvPr/>
-        </p:nvSpPr>
-        <p:spPr>
-          <a:xfrm>
-            <a:off x="4237916" y="3228945"/>
-            <a:ext cx="4558506" cy="400110"/>
-          </a:xfrm>
-          <a:prstGeom prst="rect">
-            <a:avLst/>
-          </a:prstGeom>
-        </p:spPr>
-        <p:style>
-          <a:lnRef idx="0">
-            <a:schemeClr val="accent4"/>
-          </a:lnRef>
-          <a:fillRef idx="3">
-            <a:schemeClr val="accent4"/>
-          </a:fillRef>
-          <a:effectRef idx="3">
-            <a:schemeClr val="accent4"/>
-          </a:effectRef>
-          <a:fontRef idx="minor">
-            <a:schemeClr val="lt1"/>
-          </a:fontRef>
-        </p:style>
-        <p:txBody>
-          <a:bodyPr wrap="square" rtlCol="0">
-            <a:spAutoFit/>
-          </a:bodyPr>
-          <a:lstStyle/>
-          <a:p>
-            <a:pPr algn="ctr"/>
-            <a:r>
-              <a:rPr lang="en-US" sz="2000" dirty="0">
-                <a:latin typeface="Arial" panose="020B0604020202020204" pitchFamily="34" charset="0"/>
-                <a:cs typeface="Arial" panose="020B0604020202020204" pitchFamily="34" charset="0"/>
-              </a:rPr>
-              <a:t>Filter data by expression and variance</a:t>
-            </a:r>
-          </a:p>
-        </p:txBody>
-      </p:sp>
-      <p:sp>
-        <p:nvSpPr>
-          <p:cNvPr id="17" name="TextBox 16">
-            <a:extLst>
-              <a:ext uri="{FF2B5EF4-FFF2-40B4-BE49-F238E27FC236}">
-                <a16:creationId xmlns:a16="http://schemas.microsoft.com/office/drawing/2014/main" id="{96351237-DCD5-4EDE-B060-00A8C1F74F6F}"/>
-              </a:ext>
-            </a:extLst>
-          </p:cNvPr>
-          <p:cNvSpPr txBox="1"/>
-          <p:nvPr/>
-        </p:nvSpPr>
-        <p:spPr>
-          <a:xfrm>
-            <a:off x="4237916" y="4617222"/>
-            <a:ext cx="4558506" cy="400110"/>
-          </a:xfrm>
-          <a:prstGeom prst="rect">
-            <a:avLst/>
-          </a:prstGeom>
-        </p:spPr>
-        <p:style>
-          <a:lnRef idx="0">
-            <a:schemeClr val="accent5"/>
-          </a:lnRef>
-          <a:fillRef idx="3">
-            <a:schemeClr val="accent5"/>
-          </a:fillRef>
-          <a:effectRef idx="3">
-            <a:schemeClr val="accent5"/>
-          </a:effectRef>
-          <a:fontRef idx="minor">
-            <a:schemeClr val="lt1"/>
-          </a:fontRef>
-        </p:style>
-        <p:txBody>
-          <a:bodyPr wrap="square" rtlCol="0">
-            <a:spAutoFit/>
-          </a:bodyPr>
-          <a:lstStyle/>
-          <a:p>
-            <a:pPr algn="ctr"/>
-            <a:r>
-              <a:rPr lang="en-US" sz="2000" dirty="0">
-                <a:latin typeface="Arial" panose="020B0604020202020204" pitchFamily="34" charset="0"/>
-                <a:cs typeface="Arial" panose="020B0604020202020204" pitchFamily="34" charset="0"/>
-              </a:rPr>
-              <a:t>Run NACEP on filtered dataset</a:t>
-            </a:r>
-          </a:p>
-        </p:txBody>
-      </p:sp>
-      <p:sp>
-        <p:nvSpPr>
-          <p:cNvPr id="18" name="TextBox 17">
-            <a:extLst>
-              <a:ext uri="{FF2B5EF4-FFF2-40B4-BE49-F238E27FC236}">
-                <a16:creationId xmlns:a16="http://schemas.microsoft.com/office/drawing/2014/main" id="{AD102C80-7620-43C2-9294-55EC4B338D66}"/>
-              </a:ext>
-            </a:extLst>
-          </p:cNvPr>
-          <p:cNvSpPr txBox="1"/>
-          <p:nvPr/>
-        </p:nvSpPr>
-        <p:spPr>
-          <a:xfrm>
-            <a:off x="4237916" y="6006650"/>
-            <a:ext cx="4558506" cy="400110"/>
-          </a:xfrm>
-          <a:prstGeom prst="rect">
-            <a:avLst/>
-          </a:prstGeom>
-        </p:spPr>
-        <p:style>
-          <a:lnRef idx="0">
-            <a:schemeClr val="accent6"/>
-          </a:lnRef>
-          <a:fillRef idx="3">
-            <a:schemeClr val="accent6"/>
-          </a:fillRef>
-          <a:effectRef idx="3">
-            <a:schemeClr val="accent6"/>
-          </a:effectRef>
-          <a:fontRef idx="minor">
-            <a:schemeClr val="lt1"/>
-          </a:fontRef>
-        </p:style>
-        <p:txBody>
-          <a:bodyPr wrap="square" rtlCol="0">
-            <a:spAutoFit/>
-          </a:bodyPr>
-          <a:lstStyle/>
-          <a:p>
-            <a:pPr algn="ctr"/>
-            <a:r>
-              <a:rPr lang="en-US" sz="2000" dirty="0">
-                <a:latin typeface="Arial" panose="020B0604020202020204" pitchFamily="34" charset="0"/>
-                <a:cs typeface="Arial" panose="020B0604020202020204" pitchFamily="34" charset="0"/>
-              </a:rPr>
-              <a:t>ID diff. expr. genes</a:t>
-            </a:r>
-          </a:p>
-        </p:txBody>
-      </p:sp>
-      <p:cxnSp>
-        <p:nvCxnSpPr>
-          <p:cNvPr id="19" name="Straight Arrow Connector 18">
-            <a:extLst>
-              <a:ext uri="{FF2B5EF4-FFF2-40B4-BE49-F238E27FC236}">
-                <a16:creationId xmlns:a16="http://schemas.microsoft.com/office/drawing/2014/main" id="{AE19DBF2-8BD9-4BD6-9221-8544C97C08C4}"/>
-              </a:ext>
-            </a:extLst>
-          </p:cNvPr>
-          <p:cNvCxnSpPr>
-            <a:cxnSpLocks/>
-            <a:endCxn id="14" idx="1"/>
-          </p:cNvCxnSpPr>
-          <p:nvPr/>
-        </p:nvCxnSpPr>
-        <p:spPr>
-          <a:xfrm flipV="1">
-            <a:off x="2708564" y="1840668"/>
-            <a:ext cx="1529352" cy="11764"/>
-          </a:xfrm>
-          <a:prstGeom prst="straightConnector1">
-            <a:avLst/>
-          </a:prstGeom>
-          <a:ln w="38100">
-            <a:solidFill>
-              <a:srgbClr val="AAAAAA"/>
-            </a:solidFill>
-            <a:tailEnd type="triangle"/>
-          </a:ln>
-          <a:effectLst>
-            <a:outerShdw blurRad="50800" dist="38100" dir="2700000" algn="tl" rotWithShape="0">
-              <a:prstClr val="black">
-                <a:alpha val="40000"/>
-              </a:prstClr>
-            </a:outerShdw>
-          </a:effectLst>
-        </p:spPr>
-        <p:style>
-          <a:lnRef idx="1">
-            <a:schemeClr val="accent1"/>
-          </a:lnRef>
-          <a:fillRef idx="0">
-            <a:schemeClr val="accent1"/>
-          </a:fillRef>
-          <a:effectRef idx="0">
-            <a:schemeClr val="accent1"/>
-          </a:effectRef>
-          <a:fontRef idx="minor">
-            <a:schemeClr val="tx1"/>
-          </a:fontRef>
-        </p:style>
-      </p:cxnSp>
-      <p:cxnSp>
-        <p:nvCxnSpPr>
-          <p:cNvPr id="21" name="Straight Arrow Connector 20">
-            <a:extLst>
-              <a:ext uri="{FF2B5EF4-FFF2-40B4-BE49-F238E27FC236}">
-                <a16:creationId xmlns:a16="http://schemas.microsoft.com/office/drawing/2014/main" id="{C6868F69-CF29-48EC-AF46-FFEBAB812C15}"/>
-              </a:ext>
-            </a:extLst>
-          </p:cNvPr>
-          <p:cNvCxnSpPr>
-            <a:cxnSpLocks/>
-            <a:endCxn id="16" idx="1"/>
-          </p:cNvCxnSpPr>
-          <p:nvPr/>
-        </p:nvCxnSpPr>
-        <p:spPr>
-          <a:xfrm>
-            <a:off x="2708564" y="3429000"/>
-            <a:ext cx="1529352" cy="0"/>
-          </a:xfrm>
-          <a:prstGeom prst="straightConnector1">
-            <a:avLst/>
-          </a:prstGeom>
-          <a:ln w="38100">
-            <a:solidFill>
-              <a:srgbClr val="FFC724"/>
-            </a:solidFill>
-            <a:tailEnd type="triangle"/>
-          </a:ln>
-          <a:effectLst>
-            <a:outerShdw blurRad="50800" dist="38100" dir="2700000" algn="tl" rotWithShape="0">
-              <a:prstClr val="black">
-                <a:alpha val="40000"/>
-              </a:prstClr>
-            </a:outerShdw>
-          </a:effectLst>
-        </p:spPr>
-        <p:style>
-          <a:lnRef idx="1">
-            <a:schemeClr val="accent1"/>
-          </a:lnRef>
-          <a:fillRef idx="0">
-            <a:schemeClr val="accent1"/>
-          </a:fillRef>
-          <a:effectRef idx="0">
-            <a:schemeClr val="accent1"/>
-          </a:effectRef>
-          <a:fontRef idx="minor">
-            <a:schemeClr val="tx1"/>
-          </a:fontRef>
-        </p:style>
-      </p:cxnSp>
-      <p:cxnSp>
-        <p:nvCxnSpPr>
-          <p:cNvPr id="24" name="Straight Arrow Connector 23">
-            <a:extLst>
-              <a:ext uri="{FF2B5EF4-FFF2-40B4-BE49-F238E27FC236}">
-                <a16:creationId xmlns:a16="http://schemas.microsoft.com/office/drawing/2014/main" id="{ACA85054-11B0-4553-B41A-3D8A8E6E4AF5}"/>
-              </a:ext>
-            </a:extLst>
-          </p:cNvPr>
-          <p:cNvCxnSpPr>
-            <a:cxnSpLocks/>
-          </p:cNvCxnSpPr>
-          <p:nvPr/>
-        </p:nvCxnSpPr>
-        <p:spPr>
-          <a:xfrm>
-            <a:off x="2708564" y="4817277"/>
-            <a:ext cx="1529352" cy="0"/>
-          </a:xfrm>
-          <a:prstGeom prst="straightConnector1">
-            <a:avLst/>
-          </a:prstGeom>
-          <a:ln w="38100">
-            <a:solidFill>
-              <a:srgbClr val="609FDB"/>
-            </a:solidFill>
-            <a:tailEnd type="triangle"/>
-          </a:ln>
-          <a:effectLst>
-            <a:outerShdw blurRad="50800" dist="38100" dir="2700000" algn="tl" rotWithShape="0">
-              <a:prstClr val="black">
-                <a:alpha val="40000"/>
-              </a:prstClr>
-            </a:outerShdw>
-          </a:effectLst>
-        </p:spPr>
-        <p:style>
-          <a:lnRef idx="1">
-            <a:schemeClr val="accent1"/>
-          </a:lnRef>
-          <a:fillRef idx="0">
-            <a:schemeClr val="accent1"/>
-          </a:fillRef>
-          <a:effectRef idx="0">
-            <a:schemeClr val="accent1"/>
-          </a:effectRef>
-          <a:fontRef idx="minor">
-            <a:schemeClr val="tx1"/>
-          </a:fontRef>
-        </p:style>
-      </p:cxnSp>
-      <p:cxnSp>
-        <p:nvCxnSpPr>
-          <p:cNvPr id="25" name="Straight Arrow Connector 24">
-            <a:extLst>
-              <a:ext uri="{FF2B5EF4-FFF2-40B4-BE49-F238E27FC236}">
-                <a16:creationId xmlns:a16="http://schemas.microsoft.com/office/drawing/2014/main" id="{4ECFFED8-4F34-410D-8880-6F4282FC6A99}"/>
-              </a:ext>
-            </a:extLst>
-          </p:cNvPr>
-          <p:cNvCxnSpPr>
-            <a:cxnSpLocks/>
-          </p:cNvCxnSpPr>
-          <p:nvPr/>
-        </p:nvCxnSpPr>
-        <p:spPr>
-          <a:xfrm>
-            <a:off x="2708564" y="6206705"/>
-            <a:ext cx="1529352" cy="0"/>
-          </a:xfrm>
-          <a:prstGeom prst="straightConnector1">
-            <a:avLst/>
-          </a:prstGeom>
-          <a:ln w="38100">
-            <a:solidFill>
-              <a:srgbClr val="74B44A"/>
-            </a:solidFill>
-            <a:tailEnd type="triangle"/>
-          </a:ln>
-          <a:effectLst>
-            <a:outerShdw blurRad="50800" dist="38100" dir="2700000" algn="tl" rotWithShape="0">
-              <a:prstClr val="black">
-                <a:alpha val="40000"/>
-              </a:prstClr>
-            </a:outerShdw>
-          </a:effectLst>
-        </p:spPr>
-        <p:style>
-          <a:lnRef idx="1">
-            <a:schemeClr val="accent1"/>
-          </a:lnRef>
-          <a:fillRef idx="0">
-            <a:schemeClr val="accent1"/>
-          </a:fillRef>
-          <a:effectRef idx="0">
-            <a:schemeClr val="accent1"/>
-          </a:effectRef>
-          <a:fontRef idx="minor">
-            <a:schemeClr val="tx1"/>
-          </a:fontRef>
-        </p:style>
-      </p:cxnSp>
-    </p:spTree>
-    <p:extLst>
-      <p:ext uri="{BB962C8B-B14F-4D97-AF65-F5344CB8AC3E}">
-        <p14:creationId xmlns:p14="http://schemas.microsoft.com/office/powerpoint/2010/main" val="1348944768"/>
       </p:ext>
     </p:extLst>
   </p:cSld>

</xml_diff>